<commit_message>
Facebook sharing meta data
</commit_message>
<xml_diff>
--- a/Files/img/icons/icons.pptx
+++ b/Files/img/icons/icons.pptx
@@ -8,15 +8,17 @@
     <p:sldId id="261" r:id="rId2"/>
     <p:sldId id="265" r:id="rId3"/>
     <p:sldId id="256" r:id="rId4"/>
-    <p:sldId id="257" r:id="rId5"/>
-    <p:sldId id="259" r:id="rId6"/>
-    <p:sldId id="258" r:id="rId7"/>
-    <p:sldId id="262" r:id="rId8"/>
-    <p:sldId id="266" r:id="rId9"/>
-    <p:sldId id="268" r:id="rId10"/>
-    <p:sldId id="264" r:id="rId11"/>
-    <p:sldId id="267" r:id="rId12"/>
-    <p:sldId id="269" r:id="rId13"/>
+    <p:sldId id="270" r:id="rId5"/>
+    <p:sldId id="271" r:id="rId6"/>
+    <p:sldId id="268" r:id="rId7"/>
+    <p:sldId id="266" r:id="rId8"/>
+    <p:sldId id="257" r:id="rId9"/>
+    <p:sldId id="259" r:id="rId10"/>
+    <p:sldId id="258" r:id="rId11"/>
+    <p:sldId id="262" r:id="rId12"/>
+    <p:sldId id="264" r:id="rId13"/>
+    <p:sldId id="267" r:id="rId14"/>
+    <p:sldId id="269" r:id="rId15"/>
   </p:sldIdLst>
   <p:sldSz cx="12192000" cy="6858000"/>
   <p:notesSz cx="6858000" cy="9144000"/>
@@ -254,7 +256,7 @@
           <a:p>
             <a:fld id="{CC428904-F1C2-4D26-8D70-F5FEF6F0A606}" type="datetimeFigureOut">
               <a:rPr lang="en-US" smtClean="0"/>
-              <a:t>1/20/2017</a:t>
+              <a:t>1/22/2017</a:t>
             </a:fld>
             <a:endParaRPr lang="en-US"/>
           </a:p>
@@ -424,7 +426,7 @@
           <a:p>
             <a:fld id="{CC428904-F1C2-4D26-8D70-F5FEF6F0A606}" type="datetimeFigureOut">
               <a:rPr lang="en-US" smtClean="0"/>
-              <a:t>1/20/2017</a:t>
+              <a:t>1/22/2017</a:t>
             </a:fld>
             <a:endParaRPr lang="en-US"/>
           </a:p>
@@ -604,7 +606,7 @@
           <a:p>
             <a:fld id="{CC428904-F1C2-4D26-8D70-F5FEF6F0A606}" type="datetimeFigureOut">
               <a:rPr lang="en-US" smtClean="0"/>
-              <a:t>1/20/2017</a:t>
+              <a:t>1/22/2017</a:t>
             </a:fld>
             <a:endParaRPr lang="en-US"/>
           </a:p>
@@ -774,7 +776,7 @@
           <a:p>
             <a:fld id="{CC428904-F1C2-4D26-8D70-F5FEF6F0A606}" type="datetimeFigureOut">
               <a:rPr lang="en-US" smtClean="0"/>
-              <a:t>1/20/2017</a:t>
+              <a:t>1/22/2017</a:t>
             </a:fld>
             <a:endParaRPr lang="en-US"/>
           </a:p>
@@ -1020,7 +1022,7 @@
           <a:p>
             <a:fld id="{CC428904-F1C2-4D26-8D70-F5FEF6F0A606}" type="datetimeFigureOut">
               <a:rPr lang="en-US" smtClean="0"/>
-              <a:t>1/20/2017</a:t>
+              <a:t>1/22/2017</a:t>
             </a:fld>
             <a:endParaRPr lang="en-US"/>
           </a:p>
@@ -1252,7 +1254,7 @@
           <a:p>
             <a:fld id="{CC428904-F1C2-4D26-8D70-F5FEF6F0A606}" type="datetimeFigureOut">
               <a:rPr lang="en-US" smtClean="0"/>
-              <a:t>1/20/2017</a:t>
+              <a:t>1/22/2017</a:t>
             </a:fld>
             <a:endParaRPr lang="en-US"/>
           </a:p>
@@ -1619,7 +1621,7 @@
           <a:p>
             <a:fld id="{CC428904-F1C2-4D26-8D70-F5FEF6F0A606}" type="datetimeFigureOut">
               <a:rPr lang="en-US" smtClean="0"/>
-              <a:t>1/20/2017</a:t>
+              <a:t>1/22/2017</a:t>
             </a:fld>
             <a:endParaRPr lang="en-US"/>
           </a:p>
@@ -1737,7 +1739,7 @@
           <a:p>
             <a:fld id="{CC428904-F1C2-4D26-8D70-F5FEF6F0A606}" type="datetimeFigureOut">
               <a:rPr lang="en-US" smtClean="0"/>
-              <a:t>1/20/2017</a:t>
+              <a:t>1/22/2017</a:t>
             </a:fld>
             <a:endParaRPr lang="en-US"/>
           </a:p>
@@ -1832,7 +1834,7 @@
           <a:p>
             <a:fld id="{CC428904-F1C2-4D26-8D70-F5FEF6F0A606}" type="datetimeFigureOut">
               <a:rPr lang="en-US" smtClean="0"/>
-              <a:t>1/20/2017</a:t>
+              <a:t>1/22/2017</a:t>
             </a:fld>
             <a:endParaRPr lang="en-US"/>
           </a:p>
@@ -2109,7 +2111,7 @@
           <a:p>
             <a:fld id="{CC428904-F1C2-4D26-8D70-F5FEF6F0A606}" type="datetimeFigureOut">
               <a:rPr lang="en-US" smtClean="0"/>
-              <a:t>1/20/2017</a:t>
+              <a:t>1/22/2017</a:t>
             </a:fld>
             <a:endParaRPr lang="en-US"/>
           </a:p>
@@ -2362,7 +2364,7 @@
           <a:p>
             <a:fld id="{CC428904-F1C2-4D26-8D70-F5FEF6F0A606}" type="datetimeFigureOut">
               <a:rPr lang="en-US" smtClean="0"/>
-              <a:t>1/20/2017</a:t>
+              <a:t>1/22/2017</a:t>
             </a:fld>
             <a:endParaRPr lang="en-US"/>
           </a:p>
@@ -2575,7 +2577,7 @@
           <a:p>
             <a:fld id="{CC428904-F1C2-4D26-8D70-F5FEF6F0A606}" type="datetimeFigureOut">
               <a:rPr lang="en-US" smtClean="0"/>
-              <a:t>1/20/2017</a:t>
+              <a:t>1/22/2017</a:t>
             </a:fld>
             <a:endParaRPr lang="en-US"/>
           </a:p>
@@ -3158,6 +3160,525 @@
       </p:grpSpPr>
       <p:sp>
         <p:nvSpPr>
+          <p:cNvPr id="8" name="Rectangle 7"/>
+          <p:cNvSpPr/>
+          <p:nvPr/>
+        </p:nvSpPr>
+        <p:spPr>
+          <a:xfrm>
+            <a:off x="-1" y="0"/>
+            <a:ext cx="4572000" cy="4572000"/>
+          </a:xfrm>
+          <a:prstGeom prst="rect">
+            <a:avLst/>
+          </a:prstGeom>
+          <a:solidFill>
+            <a:srgbClr val="000064"/>
+          </a:solidFill>
+          <a:ln>
+            <a:solidFill>
+              <a:srgbClr val="000064"/>
+            </a:solidFill>
+          </a:ln>
+        </p:spPr>
+        <p:style>
+          <a:lnRef idx="2">
+            <a:schemeClr val="accent1">
+              <a:shade val="50000"/>
+            </a:schemeClr>
+          </a:lnRef>
+          <a:fillRef idx="1">
+            <a:schemeClr val="accent1"/>
+          </a:fillRef>
+          <a:effectRef idx="0">
+            <a:schemeClr val="accent1"/>
+          </a:effectRef>
+          <a:fontRef idx="minor">
+            <a:schemeClr val="lt1"/>
+          </a:fontRef>
+        </p:style>
+        <p:txBody>
+          <a:bodyPr rtlCol="0" anchor="ctr"/>
+          <a:lstStyle/>
+          <a:p>
+            <a:pPr algn="ctr"/>
+            <a:endParaRPr lang="en-US"/>
+          </a:p>
+        </p:txBody>
+      </p:sp>
+      <p:sp>
+        <p:nvSpPr>
+          <p:cNvPr id="3" name="Rectangle 2"/>
+          <p:cNvSpPr/>
+          <p:nvPr/>
+        </p:nvSpPr>
+        <p:spPr>
+          <a:xfrm>
+            <a:off x="1874520" y="661016"/>
+            <a:ext cx="822960" cy="822960"/>
+          </a:xfrm>
+          <a:prstGeom prst="rect">
+            <a:avLst/>
+          </a:prstGeom>
+          <a:solidFill>
+            <a:schemeClr val="bg1"/>
+          </a:solidFill>
+          <a:ln>
+            <a:noFill/>
+          </a:ln>
+        </p:spPr>
+        <p:style>
+          <a:lnRef idx="2">
+            <a:schemeClr val="accent1">
+              <a:shade val="50000"/>
+            </a:schemeClr>
+          </a:lnRef>
+          <a:fillRef idx="1">
+            <a:schemeClr val="accent1"/>
+          </a:fillRef>
+          <a:effectRef idx="0">
+            <a:schemeClr val="accent1"/>
+          </a:effectRef>
+          <a:fontRef idx="minor">
+            <a:schemeClr val="lt1"/>
+          </a:fontRef>
+        </p:style>
+        <p:txBody>
+          <a:bodyPr rtlCol="0" anchor="ctr"/>
+          <a:lstStyle/>
+          <a:p>
+            <a:pPr algn="ctr"/>
+            <a:endParaRPr lang="en-US"/>
+          </a:p>
+        </p:txBody>
+      </p:sp>
+      <p:sp>
+        <p:nvSpPr>
+          <p:cNvPr id="12" name="Rectangle 11"/>
+          <p:cNvSpPr/>
+          <p:nvPr/>
+        </p:nvSpPr>
+        <p:spPr>
+          <a:xfrm>
+            <a:off x="1600200" y="1770611"/>
+            <a:ext cx="1371600" cy="2518756"/>
+          </a:xfrm>
+          <a:prstGeom prst="rect">
+            <a:avLst/>
+          </a:prstGeom>
+          <a:solidFill>
+            <a:schemeClr val="bg1"/>
+          </a:solidFill>
+          <a:ln>
+            <a:noFill/>
+          </a:ln>
+        </p:spPr>
+        <p:style>
+          <a:lnRef idx="2">
+            <a:schemeClr val="accent1">
+              <a:shade val="50000"/>
+            </a:schemeClr>
+          </a:lnRef>
+          <a:fillRef idx="1">
+            <a:schemeClr val="accent1"/>
+          </a:fillRef>
+          <a:effectRef idx="0">
+            <a:schemeClr val="accent1"/>
+          </a:effectRef>
+          <a:fontRef idx="minor">
+            <a:schemeClr val="lt1"/>
+          </a:fontRef>
+        </p:style>
+        <p:txBody>
+          <a:bodyPr rtlCol="0" anchor="ctr"/>
+          <a:lstStyle/>
+          <a:p>
+            <a:pPr algn="ctr"/>
+            <a:endParaRPr lang="en-US"/>
+          </a:p>
+        </p:txBody>
+      </p:sp>
+      <p:sp>
+        <p:nvSpPr>
+          <p:cNvPr id="13" name="Rectangle 12"/>
+          <p:cNvSpPr/>
+          <p:nvPr/>
+        </p:nvSpPr>
+        <p:spPr>
+          <a:xfrm>
+            <a:off x="914400" y="1770611"/>
+            <a:ext cx="2743200" cy="457200"/>
+          </a:xfrm>
+          <a:prstGeom prst="rect">
+            <a:avLst/>
+          </a:prstGeom>
+          <a:solidFill>
+            <a:schemeClr val="bg1"/>
+          </a:solidFill>
+          <a:ln>
+            <a:noFill/>
+          </a:ln>
+        </p:spPr>
+        <p:style>
+          <a:lnRef idx="2">
+            <a:schemeClr val="accent1">
+              <a:shade val="50000"/>
+            </a:schemeClr>
+          </a:lnRef>
+          <a:fillRef idx="1">
+            <a:schemeClr val="accent1"/>
+          </a:fillRef>
+          <a:effectRef idx="0">
+            <a:schemeClr val="accent1"/>
+          </a:effectRef>
+          <a:fontRef idx="minor">
+            <a:schemeClr val="lt1"/>
+          </a:fontRef>
+        </p:style>
+        <p:txBody>
+          <a:bodyPr rtlCol="0" anchor="ctr"/>
+          <a:lstStyle/>
+          <a:p>
+            <a:pPr algn="ctr"/>
+            <a:endParaRPr lang="en-US"/>
+          </a:p>
+        </p:txBody>
+      </p:sp>
+      <p:sp>
+        <p:nvSpPr>
+          <p:cNvPr id="14" name="Rectangle 13"/>
+          <p:cNvSpPr/>
+          <p:nvPr/>
+        </p:nvSpPr>
+        <p:spPr>
+          <a:xfrm>
+            <a:off x="914400" y="2113588"/>
+            <a:ext cx="423949" cy="1477510"/>
+          </a:xfrm>
+          <a:prstGeom prst="rect">
+            <a:avLst/>
+          </a:prstGeom>
+          <a:solidFill>
+            <a:schemeClr val="bg1"/>
+          </a:solidFill>
+          <a:ln>
+            <a:noFill/>
+          </a:ln>
+        </p:spPr>
+        <p:style>
+          <a:lnRef idx="2">
+            <a:schemeClr val="accent1">
+              <a:shade val="50000"/>
+            </a:schemeClr>
+          </a:lnRef>
+          <a:fillRef idx="1">
+            <a:schemeClr val="accent1"/>
+          </a:fillRef>
+          <a:effectRef idx="0">
+            <a:schemeClr val="accent1"/>
+          </a:effectRef>
+          <a:fontRef idx="minor">
+            <a:schemeClr val="lt1"/>
+          </a:fontRef>
+        </p:style>
+        <p:txBody>
+          <a:bodyPr rtlCol="0" anchor="ctr"/>
+          <a:lstStyle/>
+          <a:p>
+            <a:pPr algn="ctr"/>
+            <a:endParaRPr lang="en-US"/>
+          </a:p>
+        </p:txBody>
+      </p:sp>
+      <p:sp>
+        <p:nvSpPr>
+          <p:cNvPr id="15" name="Rectangle 14"/>
+          <p:cNvSpPr/>
+          <p:nvPr/>
+        </p:nvSpPr>
+        <p:spPr>
+          <a:xfrm>
+            <a:off x="3233651" y="2113588"/>
+            <a:ext cx="423949" cy="1477510"/>
+          </a:xfrm>
+          <a:prstGeom prst="rect">
+            <a:avLst/>
+          </a:prstGeom>
+          <a:solidFill>
+            <a:schemeClr val="bg1"/>
+          </a:solidFill>
+          <a:ln>
+            <a:noFill/>
+          </a:ln>
+        </p:spPr>
+        <p:style>
+          <a:lnRef idx="2">
+            <a:schemeClr val="accent1">
+              <a:shade val="50000"/>
+            </a:schemeClr>
+          </a:lnRef>
+          <a:fillRef idx="1">
+            <a:schemeClr val="accent1"/>
+          </a:fillRef>
+          <a:effectRef idx="0">
+            <a:schemeClr val="accent1"/>
+          </a:effectRef>
+          <a:fontRef idx="minor">
+            <a:schemeClr val="lt1"/>
+          </a:fontRef>
+        </p:style>
+        <p:txBody>
+          <a:bodyPr rtlCol="0" anchor="ctr"/>
+          <a:lstStyle/>
+          <a:p>
+            <a:pPr algn="ctr"/>
+            <a:endParaRPr lang="en-US"/>
+          </a:p>
+        </p:txBody>
+      </p:sp>
+    </p:spTree>
+    <p:extLst>
+      <p:ext uri="{BB962C8B-B14F-4D97-AF65-F5344CB8AC3E}">
+        <p14:creationId xmlns:p14="http://schemas.microsoft.com/office/powerpoint/2010/main" val="2477081356"/>
+      </p:ext>
+    </p:extLst>
+  </p:cSld>
+  <p:clrMapOvr>
+    <a:masterClrMapping/>
+  </p:clrMapOvr>
+  <p:timing>
+    <p:tnLst>
+      <p:par>
+        <p:cTn id="1" dur="indefinite" restart="never" nodeType="tmRoot"/>
+      </p:par>
+    </p:tnLst>
+  </p:timing>
+</p:sld>
+</file>
+
+<file path=ppt/slides/slide11.xml><?xml version="1.0" encoding="utf-8"?>
+<p:sld xmlns:a="http://schemas.openxmlformats.org/drawingml/2006/main" xmlns:r="http://schemas.openxmlformats.org/officeDocument/2006/relationships" xmlns:p="http://schemas.openxmlformats.org/presentationml/2006/main">
+  <p:cSld>
+    <p:spTree>
+      <p:nvGrpSpPr>
+        <p:cNvPr id="1" name=""/>
+        <p:cNvGrpSpPr/>
+        <p:nvPr/>
+      </p:nvGrpSpPr>
+      <p:grpSpPr>
+        <a:xfrm>
+          <a:off x="0" y="0"/>
+          <a:ext cx="0" cy="0"/>
+          <a:chOff x="0" y="0"/>
+          <a:chExt cx="0" cy="0"/>
+        </a:xfrm>
+      </p:grpSpPr>
+      <p:sp>
+        <p:nvSpPr>
+          <p:cNvPr id="5" name="Rectangle 4"/>
+          <p:cNvSpPr/>
+          <p:nvPr/>
+        </p:nvSpPr>
+        <p:spPr>
+          <a:xfrm>
+            <a:off x="-1" y="0"/>
+            <a:ext cx="4572000" cy="4572000"/>
+          </a:xfrm>
+          <a:prstGeom prst="rect">
+            <a:avLst/>
+          </a:prstGeom>
+          <a:solidFill>
+            <a:srgbClr val="000064"/>
+          </a:solidFill>
+          <a:ln>
+            <a:solidFill>
+              <a:srgbClr val="000064"/>
+            </a:solidFill>
+          </a:ln>
+        </p:spPr>
+        <p:style>
+          <a:lnRef idx="2">
+            <a:schemeClr val="accent1">
+              <a:shade val="50000"/>
+            </a:schemeClr>
+          </a:lnRef>
+          <a:fillRef idx="1">
+            <a:schemeClr val="accent1"/>
+          </a:fillRef>
+          <a:effectRef idx="0">
+            <a:schemeClr val="accent1"/>
+          </a:effectRef>
+          <a:fontRef idx="minor">
+            <a:schemeClr val="lt1"/>
+          </a:fontRef>
+        </p:style>
+        <p:txBody>
+          <a:bodyPr rtlCol="0" anchor="ctr"/>
+          <a:lstStyle/>
+          <a:p>
+            <a:pPr algn="ctr"/>
+            <a:endParaRPr lang="en-US"/>
+          </a:p>
+        </p:txBody>
+      </p:sp>
+      <p:grpSp>
+        <p:nvGrpSpPr>
+          <p:cNvPr id="2" name="Group 1"/>
+          <p:cNvGrpSpPr/>
+          <p:nvPr/>
+        </p:nvGrpSpPr>
+        <p:grpSpPr>
+          <a:xfrm>
+            <a:off x="1382359" y="1507721"/>
+            <a:ext cx="1807279" cy="1556558"/>
+            <a:chOff x="1382360" y="1230185"/>
+            <a:chExt cx="1807279" cy="1556558"/>
+          </a:xfrm>
+        </p:grpSpPr>
+        <p:sp>
+          <p:nvSpPr>
+            <p:cNvPr id="9" name="Rectangle 8"/>
+            <p:cNvSpPr/>
+            <p:nvPr/>
+          </p:nvSpPr>
+          <p:spPr>
+            <a:xfrm>
+              <a:off x="2238990" y="1230185"/>
+              <a:ext cx="950649" cy="1556558"/>
+            </a:xfrm>
+            <a:prstGeom prst="rect">
+              <a:avLst/>
+            </a:prstGeom>
+            <a:solidFill>
+              <a:schemeClr val="bg1"/>
+            </a:solidFill>
+            <a:ln w="38100">
+              <a:solidFill>
+                <a:srgbClr val="000064"/>
+              </a:solidFill>
+            </a:ln>
+            <a:scene3d>
+              <a:camera prst="isometricOffAxis1Right"/>
+              <a:lightRig rig="threePt" dir="t"/>
+            </a:scene3d>
+          </p:spPr>
+          <p:style>
+            <a:lnRef idx="2">
+              <a:schemeClr val="accent1">
+                <a:shade val="50000"/>
+              </a:schemeClr>
+            </a:lnRef>
+            <a:fillRef idx="1">
+              <a:schemeClr val="accent1"/>
+            </a:fillRef>
+            <a:effectRef idx="0">
+              <a:schemeClr val="accent1"/>
+            </a:effectRef>
+            <a:fontRef idx="minor">
+              <a:schemeClr val="lt1"/>
+            </a:fontRef>
+          </p:style>
+          <p:txBody>
+            <a:bodyPr rtlCol="0" anchor="ctr"/>
+            <a:lstStyle/>
+            <a:p>
+              <a:pPr algn="ctr"/>
+              <a:endParaRPr lang="en-US"/>
+            </a:p>
+          </p:txBody>
+        </p:sp>
+        <p:sp>
+          <p:nvSpPr>
+            <p:cNvPr id="10" name="Rectangle 9"/>
+            <p:cNvSpPr/>
+            <p:nvPr/>
+          </p:nvSpPr>
+          <p:spPr>
+            <a:xfrm>
+              <a:off x="1382360" y="1230185"/>
+              <a:ext cx="950649" cy="1556558"/>
+            </a:xfrm>
+            <a:prstGeom prst="rect">
+              <a:avLst/>
+            </a:prstGeom>
+            <a:solidFill>
+              <a:schemeClr val="bg1"/>
+            </a:solidFill>
+            <a:ln w="38100">
+              <a:solidFill>
+                <a:srgbClr val="000064"/>
+              </a:solidFill>
+            </a:ln>
+            <a:scene3d>
+              <a:camera prst="isometricOffAxis2Left"/>
+              <a:lightRig rig="threePt" dir="t"/>
+            </a:scene3d>
+          </p:spPr>
+          <p:style>
+            <a:lnRef idx="2">
+              <a:schemeClr val="accent1">
+                <a:shade val="50000"/>
+              </a:schemeClr>
+            </a:lnRef>
+            <a:fillRef idx="1">
+              <a:schemeClr val="accent1"/>
+            </a:fillRef>
+            <a:effectRef idx="0">
+              <a:schemeClr val="accent1"/>
+            </a:effectRef>
+            <a:fontRef idx="minor">
+              <a:schemeClr val="lt1"/>
+            </a:fontRef>
+          </p:style>
+          <p:txBody>
+            <a:bodyPr rtlCol="0" anchor="ctr"/>
+            <a:lstStyle/>
+            <a:p>
+              <a:pPr algn="ctr"/>
+              <a:endParaRPr lang="en-US"/>
+            </a:p>
+          </p:txBody>
+        </p:sp>
+      </p:grpSp>
+    </p:spTree>
+    <p:extLst>
+      <p:ext uri="{BB962C8B-B14F-4D97-AF65-F5344CB8AC3E}">
+        <p14:creationId xmlns:p14="http://schemas.microsoft.com/office/powerpoint/2010/main" val="231432628"/>
+      </p:ext>
+    </p:extLst>
+  </p:cSld>
+  <p:clrMapOvr>
+    <a:masterClrMapping/>
+  </p:clrMapOvr>
+  <p:timing>
+    <p:tnLst>
+      <p:par>
+        <p:cTn id="1" dur="indefinite" restart="never" nodeType="tmRoot"/>
+      </p:par>
+    </p:tnLst>
+  </p:timing>
+</p:sld>
+</file>
+
+<file path=ppt/slides/slide12.xml><?xml version="1.0" encoding="utf-8"?>
+<p:sld xmlns:a="http://schemas.openxmlformats.org/drawingml/2006/main" xmlns:r="http://schemas.openxmlformats.org/officeDocument/2006/relationships" xmlns:p="http://schemas.openxmlformats.org/presentationml/2006/main">
+  <p:cSld>
+    <p:spTree>
+      <p:nvGrpSpPr>
+        <p:cNvPr id="1" name=""/>
+        <p:cNvGrpSpPr/>
+        <p:nvPr/>
+      </p:nvGrpSpPr>
+      <p:grpSpPr>
+        <a:xfrm>
+          <a:off x="0" y="0"/>
+          <a:ext cx="0" cy="0"/>
+          <a:chOff x="0" y="0"/>
+          <a:chExt cx="0" cy="0"/>
+        </a:xfrm>
+      </p:grpSpPr>
+      <p:sp>
+        <p:nvSpPr>
           <p:cNvPr id="3" name="Half Frame 2"/>
           <p:cNvSpPr/>
           <p:nvPr/>
@@ -3226,7 +3747,7 @@
 </p:sld>
 </file>
 
-<file path=ppt/slides/slide11.xml><?xml version="1.0" encoding="utf-8"?>
+<file path=ppt/slides/slide13.xml><?xml version="1.0" encoding="utf-8"?>
 <p:sld xmlns:a="http://schemas.openxmlformats.org/drawingml/2006/main" xmlns:r="http://schemas.openxmlformats.org/officeDocument/2006/relationships" xmlns:p="http://schemas.openxmlformats.org/presentationml/2006/main">
   <p:cSld>
     <p:spTree>
@@ -3477,7 +3998,7 @@
 </p:sld>
 </file>
 
-<file path=ppt/slides/slide12.xml><?xml version="1.0" encoding="utf-8"?>
+<file path=ppt/slides/slide14.xml><?xml version="1.0" encoding="utf-8"?>
 <p:sld xmlns:a="http://schemas.openxmlformats.org/drawingml/2006/main" xmlns:r="http://schemas.openxmlformats.org/officeDocument/2006/relationships" xmlns:p="http://schemas.openxmlformats.org/presentationml/2006/main">
   <p:cSld>
     <p:spTree>
@@ -4339,6 +4860,1874 @@
       </p:grpSpPr>
       <p:sp>
         <p:nvSpPr>
+          <p:cNvPr id="4" name="Rectangle 3"/>
+          <p:cNvSpPr/>
+          <p:nvPr/>
+        </p:nvSpPr>
+        <p:spPr>
+          <a:xfrm>
+            <a:off x="0" y="0"/>
+            <a:ext cx="4572000" cy="4572000"/>
+          </a:xfrm>
+          <a:prstGeom prst="rect">
+            <a:avLst/>
+          </a:prstGeom>
+          <a:solidFill>
+            <a:srgbClr val="000064"/>
+          </a:solidFill>
+          <a:ln>
+            <a:solidFill>
+              <a:srgbClr val="000064"/>
+            </a:solidFill>
+          </a:ln>
+        </p:spPr>
+        <p:style>
+          <a:lnRef idx="2">
+            <a:schemeClr val="accent1">
+              <a:shade val="50000"/>
+            </a:schemeClr>
+          </a:lnRef>
+          <a:fillRef idx="1">
+            <a:schemeClr val="accent1"/>
+          </a:fillRef>
+          <a:effectRef idx="0">
+            <a:schemeClr val="accent1"/>
+          </a:effectRef>
+          <a:fontRef idx="minor">
+            <a:schemeClr val="lt1"/>
+          </a:fontRef>
+        </p:style>
+        <p:txBody>
+          <a:bodyPr rtlCol="0" anchor="ctr"/>
+          <a:lstStyle/>
+          <a:p>
+            <a:pPr algn="ctr"/>
+            <a:endParaRPr lang="en-US"/>
+          </a:p>
+        </p:txBody>
+      </p:sp>
+      <p:grpSp>
+        <p:nvGrpSpPr>
+          <p:cNvPr id="23" name="Group 22"/>
+          <p:cNvGrpSpPr/>
+          <p:nvPr/>
+        </p:nvGrpSpPr>
+        <p:grpSpPr>
+          <a:xfrm>
+            <a:off x="914400" y="1417320"/>
+            <a:ext cx="2743200" cy="1737360"/>
+            <a:chOff x="891540" y="1182128"/>
+            <a:chExt cx="2743200" cy="1737360"/>
+          </a:xfrm>
+        </p:grpSpPr>
+        <p:sp>
+          <p:nvSpPr>
+            <p:cNvPr id="17" name="Round Same Side Corner Rectangle 16"/>
+            <p:cNvSpPr/>
+            <p:nvPr/>
+          </p:nvSpPr>
+          <p:spPr>
+            <a:xfrm>
+              <a:off x="891540" y="1182128"/>
+              <a:ext cx="2743200" cy="1737360"/>
+            </a:xfrm>
+            <a:prstGeom prst="round2SameRect">
+              <a:avLst>
+                <a:gd name="adj1" fmla="val 2109"/>
+                <a:gd name="adj2" fmla="val 0"/>
+              </a:avLst>
+            </a:prstGeom>
+            <a:solidFill>
+              <a:schemeClr val="bg1"/>
+            </a:solidFill>
+            <a:ln>
+              <a:noFill/>
+            </a:ln>
+          </p:spPr>
+          <p:style>
+            <a:lnRef idx="2">
+              <a:schemeClr val="accent1">
+                <a:shade val="50000"/>
+              </a:schemeClr>
+            </a:lnRef>
+            <a:fillRef idx="1">
+              <a:schemeClr val="accent1"/>
+            </a:fillRef>
+            <a:effectRef idx="0">
+              <a:schemeClr val="accent1"/>
+            </a:effectRef>
+            <a:fontRef idx="minor">
+              <a:schemeClr val="lt1"/>
+            </a:fontRef>
+          </p:style>
+          <p:txBody>
+            <a:bodyPr rtlCol="0" anchor="ctr"/>
+            <a:lstStyle/>
+            <a:p>
+              <a:pPr algn="ctr"/>
+              <a:endParaRPr lang="en-US"/>
+            </a:p>
+          </p:txBody>
+        </p:sp>
+        <p:sp>
+          <p:nvSpPr>
+            <p:cNvPr id="19" name="Round Same Side Corner Rectangle 18"/>
+            <p:cNvSpPr/>
+            <p:nvPr/>
+          </p:nvSpPr>
+          <p:spPr>
+            <a:xfrm>
+              <a:off x="982980" y="1260600"/>
+              <a:ext cx="2560320" cy="1600200"/>
+            </a:xfrm>
+            <a:prstGeom prst="round2SameRect">
+              <a:avLst>
+                <a:gd name="adj1" fmla="val 0"/>
+                <a:gd name="adj2" fmla="val 0"/>
+              </a:avLst>
+            </a:prstGeom>
+            <a:solidFill>
+              <a:srgbClr val="000064"/>
+            </a:solidFill>
+            <a:ln>
+              <a:noFill/>
+            </a:ln>
+          </p:spPr>
+          <p:style>
+            <a:lnRef idx="2">
+              <a:schemeClr val="accent1">
+                <a:shade val="50000"/>
+              </a:schemeClr>
+            </a:lnRef>
+            <a:fillRef idx="1">
+              <a:schemeClr val="accent1"/>
+            </a:fillRef>
+            <a:effectRef idx="0">
+              <a:schemeClr val="accent1"/>
+            </a:effectRef>
+            <a:fontRef idx="minor">
+              <a:schemeClr val="lt1"/>
+            </a:fontRef>
+          </p:style>
+          <p:txBody>
+            <a:bodyPr rtlCol="0" anchor="ctr"/>
+            <a:lstStyle/>
+            <a:p>
+              <a:pPr algn="ctr"/>
+              <a:endParaRPr lang="en-US"/>
+            </a:p>
+          </p:txBody>
+        </p:sp>
+        <p:sp>
+          <p:nvSpPr>
+            <p:cNvPr id="20" name="Oval 19"/>
+            <p:cNvSpPr/>
+            <p:nvPr/>
+          </p:nvSpPr>
+          <p:spPr>
+            <a:xfrm>
+              <a:off x="2240280" y="1198504"/>
+              <a:ext cx="45720" cy="45720"/>
+            </a:xfrm>
+            <a:prstGeom prst="ellipse">
+              <a:avLst/>
+            </a:prstGeom>
+            <a:solidFill>
+              <a:srgbClr val="000064"/>
+            </a:solidFill>
+            <a:ln>
+              <a:noFill/>
+            </a:ln>
+          </p:spPr>
+          <p:style>
+            <a:lnRef idx="2">
+              <a:schemeClr val="accent1">
+                <a:shade val="50000"/>
+              </a:schemeClr>
+            </a:lnRef>
+            <a:fillRef idx="1">
+              <a:schemeClr val="accent1"/>
+            </a:fillRef>
+            <a:effectRef idx="0">
+              <a:schemeClr val="accent1"/>
+            </a:effectRef>
+            <a:fontRef idx="minor">
+              <a:schemeClr val="lt1"/>
+            </a:fontRef>
+          </p:style>
+          <p:txBody>
+            <a:bodyPr rtlCol="0" anchor="ctr"/>
+            <a:lstStyle/>
+            <a:p>
+              <a:pPr algn="ctr"/>
+              <a:endParaRPr lang="en-US"/>
+            </a:p>
+          </p:txBody>
+        </p:sp>
+      </p:grpSp>
+      <p:sp>
+        <p:nvSpPr>
+          <p:cNvPr id="7" name="Rectangle 6"/>
+          <p:cNvSpPr/>
+          <p:nvPr/>
+        </p:nvSpPr>
+        <p:spPr>
+          <a:xfrm>
+            <a:off x="685800" y="3187432"/>
+            <a:ext cx="3200400" cy="91440"/>
+          </a:xfrm>
+          <a:prstGeom prst="rect">
+            <a:avLst/>
+          </a:prstGeom>
+          <a:solidFill>
+            <a:schemeClr val="bg1"/>
+          </a:solidFill>
+          <a:ln>
+            <a:noFill/>
+          </a:ln>
+        </p:spPr>
+        <p:style>
+          <a:lnRef idx="2">
+            <a:schemeClr val="accent1">
+              <a:shade val="50000"/>
+            </a:schemeClr>
+          </a:lnRef>
+          <a:fillRef idx="1">
+            <a:schemeClr val="accent1"/>
+          </a:fillRef>
+          <a:effectRef idx="0">
+            <a:schemeClr val="accent1"/>
+          </a:effectRef>
+          <a:fontRef idx="minor">
+            <a:schemeClr val="lt1"/>
+          </a:fontRef>
+        </p:style>
+        <p:txBody>
+          <a:bodyPr rtlCol="0" anchor="ctr"/>
+          <a:lstStyle/>
+          <a:p>
+            <a:pPr algn="ctr"/>
+            <a:endParaRPr lang="en-US"/>
+          </a:p>
+        </p:txBody>
+      </p:sp>
+      <p:sp>
+        <p:nvSpPr>
+          <p:cNvPr id="8" name="Right Triangle 7"/>
+          <p:cNvSpPr/>
+          <p:nvPr/>
+        </p:nvSpPr>
+        <p:spPr>
+          <a:xfrm>
+            <a:off x="685800" y="3187432"/>
+            <a:ext cx="228600" cy="91440"/>
+          </a:xfrm>
+          <a:prstGeom prst="rtTriangle">
+            <a:avLst/>
+          </a:prstGeom>
+          <a:solidFill>
+            <a:srgbClr val="000064"/>
+          </a:solidFill>
+          <a:ln>
+            <a:noFill/>
+          </a:ln>
+        </p:spPr>
+        <p:style>
+          <a:lnRef idx="2">
+            <a:schemeClr val="accent1">
+              <a:shade val="50000"/>
+            </a:schemeClr>
+          </a:lnRef>
+          <a:fillRef idx="1">
+            <a:schemeClr val="accent1"/>
+          </a:fillRef>
+          <a:effectRef idx="0">
+            <a:schemeClr val="accent1"/>
+          </a:effectRef>
+          <a:fontRef idx="minor">
+            <a:schemeClr val="lt1"/>
+          </a:fontRef>
+        </p:style>
+        <p:txBody>
+          <a:bodyPr rtlCol="0" anchor="ctr"/>
+          <a:lstStyle/>
+          <a:p>
+            <a:pPr algn="ctr"/>
+            <a:endParaRPr lang="en-US"/>
+          </a:p>
+        </p:txBody>
+      </p:sp>
+      <p:sp>
+        <p:nvSpPr>
+          <p:cNvPr id="22" name="Right Triangle 21"/>
+          <p:cNvSpPr/>
+          <p:nvPr/>
+        </p:nvSpPr>
+        <p:spPr>
+          <a:xfrm flipH="1">
+            <a:off x="3657600" y="3187432"/>
+            <a:ext cx="228600" cy="91440"/>
+          </a:xfrm>
+          <a:prstGeom prst="rtTriangle">
+            <a:avLst/>
+          </a:prstGeom>
+          <a:solidFill>
+            <a:srgbClr val="000064"/>
+          </a:solidFill>
+          <a:ln>
+            <a:noFill/>
+          </a:ln>
+        </p:spPr>
+        <p:style>
+          <a:lnRef idx="2">
+            <a:schemeClr val="accent1">
+              <a:shade val="50000"/>
+            </a:schemeClr>
+          </a:lnRef>
+          <a:fillRef idx="1">
+            <a:schemeClr val="accent1"/>
+          </a:fillRef>
+          <a:effectRef idx="0">
+            <a:schemeClr val="accent1"/>
+          </a:effectRef>
+          <a:fontRef idx="minor">
+            <a:schemeClr val="lt1"/>
+          </a:fontRef>
+        </p:style>
+        <p:txBody>
+          <a:bodyPr rtlCol="0" anchor="ctr"/>
+          <a:lstStyle/>
+          <a:p>
+            <a:pPr algn="ctr"/>
+            <a:endParaRPr lang="en-US"/>
+          </a:p>
+        </p:txBody>
+      </p:sp>
+    </p:spTree>
+    <p:extLst>
+      <p:ext uri="{BB962C8B-B14F-4D97-AF65-F5344CB8AC3E}">
+        <p14:creationId xmlns:p14="http://schemas.microsoft.com/office/powerpoint/2010/main" val="3333692"/>
+      </p:ext>
+    </p:extLst>
+  </p:cSld>
+  <p:clrMapOvr>
+    <a:masterClrMapping/>
+  </p:clrMapOvr>
+</p:sld>
+</file>
+
+<file path=ppt/slides/slide5.xml><?xml version="1.0" encoding="utf-8"?>
+<p:sld xmlns:a="http://schemas.openxmlformats.org/drawingml/2006/main" xmlns:r="http://schemas.openxmlformats.org/officeDocument/2006/relationships" xmlns:p="http://schemas.openxmlformats.org/presentationml/2006/main">
+  <p:cSld>
+    <p:spTree>
+      <p:nvGrpSpPr>
+        <p:cNvPr id="1" name=""/>
+        <p:cNvGrpSpPr/>
+        <p:nvPr/>
+      </p:nvGrpSpPr>
+      <p:grpSpPr>
+        <a:xfrm>
+          <a:off x="0" y="0"/>
+          <a:ext cx="0" cy="0"/>
+          <a:chOff x="0" y="0"/>
+          <a:chExt cx="0" cy="0"/>
+        </a:xfrm>
+      </p:grpSpPr>
+      <p:sp>
+        <p:nvSpPr>
+          <p:cNvPr id="4" name="Rectangle 3"/>
+          <p:cNvSpPr/>
+          <p:nvPr/>
+        </p:nvSpPr>
+        <p:spPr>
+          <a:xfrm>
+            <a:off x="8333" y="0"/>
+            <a:ext cx="4572000" cy="4572000"/>
+          </a:xfrm>
+          <a:prstGeom prst="rect">
+            <a:avLst/>
+          </a:prstGeom>
+          <a:solidFill>
+            <a:srgbClr val="000064"/>
+          </a:solidFill>
+          <a:ln>
+            <a:solidFill>
+              <a:srgbClr val="000064"/>
+            </a:solidFill>
+          </a:ln>
+        </p:spPr>
+        <p:style>
+          <a:lnRef idx="2">
+            <a:schemeClr val="accent1">
+              <a:shade val="50000"/>
+            </a:schemeClr>
+          </a:lnRef>
+          <a:fillRef idx="1">
+            <a:schemeClr val="accent1"/>
+          </a:fillRef>
+          <a:effectRef idx="0">
+            <a:schemeClr val="accent1"/>
+          </a:effectRef>
+          <a:fontRef idx="minor">
+            <a:schemeClr val="lt1"/>
+          </a:fontRef>
+        </p:style>
+        <p:txBody>
+          <a:bodyPr rtlCol="0" anchor="ctr"/>
+          <a:lstStyle/>
+          <a:p>
+            <a:pPr algn="ctr"/>
+            <a:endParaRPr lang="en-US"/>
+          </a:p>
+        </p:txBody>
+      </p:sp>
+      <p:grpSp>
+        <p:nvGrpSpPr>
+          <p:cNvPr id="62" name="Group 61"/>
+          <p:cNvGrpSpPr/>
+          <p:nvPr/>
+        </p:nvGrpSpPr>
+        <p:grpSpPr>
+          <a:xfrm>
+            <a:off x="1259998" y="1356116"/>
+            <a:ext cx="2068669" cy="1859768"/>
+            <a:chOff x="1361617" y="1194294"/>
+            <a:chExt cx="2068669" cy="1859768"/>
+          </a:xfrm>
+        </p:grpSpPr>
+        <p:sp>
+          <p:nvSpPr>
+            <p:cNvPr id="6" name="Oval 5"/>
+            <p:cNvSpPr/>
+            <p:nvPr/>
+          </p:nvSpPr>
+          <p:spPr>
+            <a:xfrm>
+              <a:off x="1553575" y="2953478"/>
+              <a:ext cx="100584" cy="100584"/>
+            </a:xfrm>
+            <a:prstGeom prst="ellipse">
+              <a:avLst/>
+            </a:prstGeom>
+            <a:solidFill>
+              <a:schemeClr val="bg1"/>
+            </a:solidFill>
+            <a:ln>
+              <a:noFill/>
+            </a:ln>
+          </p:spPr>
+          <p:style>
+            <a:lnRef idx="2">
+              <a:schemeClr val="accent1">
+                <a:shade val="50000"/>
+              </a:schemeClr>
+            </a:lnRef>
+            <a:fillRef idx="1">
+              <a:schemeClr val="accent1"/>
+            </a:fillRef>
+            <a:effectRef idx="0">
+              <a:schemeClr val="accent1"/>
+            </a:effectRef>
+            <a:fontRef idx="minor">
+              <a:schemeClr val="lt1"/>
+            </a:fontRef>
+          </p:style>
+          <p:txBody>
+            <a:bodyPr rtlCol="0" anchor="ctr"/>
+            <a:lstStyle/>
+            <a:p>
+              <a:pPr algn="ctr"/>
+              <a:endParaRPr lang="en-US"/>
+            </a:p>
+          </p:txBody>
+        </p:sp>
+        <p:grpSp>
+          <p:nvGrpSpPr>
+            <p:cNvPr id="3" name="Group 2"/>
+            <p:cNvGrpSpPr/>
+            <p:nvPr/>
+          </p:nvGrpSpPr>
+          <p:grpSpPr>
+            <a:xfrm>
+              <a:off x="1601486" y="2953478"/>
+              <a:ext cx="1828800" cy="100584"/>
+              <a:chOff x="838200" y="3339832"/>
+              <a:chExt cx="3200400" cy="91440"/>
+            </a:xfrm>
+          </p:grpSpPr>
+          <p:sp>
+            <p:nvSpPr>
+              <p:cNvPr id="11" name="Rectangle 10"/>
+              <p:cNvSpPr/>
+              <p:nvPr/>
+            </p:nvSpPr>
+            <p:spPr>
+              <a:xfrm>
+                <a:off x="838200" y="3339832"/>
+                <a:ext cx="3200400" cy="91440"/>
+              </a:xfrm>
+              <a:prstGeom prst="rect">
+                <a:avLst/>
+              </a:prstGeom>
+              <a:solidFill>
+                <a:schemeClr val="bg1"/>
+              </a:solidFill>
+              <a:ln>
+                <a:noFill/>
+              </a:ln>
+            </p:spPr>
+            <p:style>
+              <a:lnRef idx="2">
+                <a:schemeClr val="accent1">
+                  <a:shade val="50000"/>
+                </a:schemeClr>
+              </a:lnRef>
+              <a:fillRef idx="1">
+                <a:schemeClr val="accent1"/>
+              </a:fillRef>
+              <a:effectRef idx="0">
+                <a:schemeClr val="accent1"/>
+              </a:effectRef>
+              <a:fontRef idx="minor">
+                <a:schemeClr val="lt1"/>
+              </a:fontRef>
+            </p:style>
+            <p:txBody>
+              <a:bodyPr rtlCol="0" anchor="ctr"/>
+              <a:lstStyle/>
+              <a:p>
+                <a:pPr algn="ctr"/>
+                <a:endParaRPr lang="en-US"/>
+              </a:p>
+            </p:txBody>
+          </p:sp>
+          <p:sp>
+            <p:nvSpPr>
+              <p:cNvPr id="13" name="Right Triangle 12"/>
+              <p:cNvSpPr/>
+              <p:nvPr/>
+            </p:nvSpPr>
+            <p:spPr>
+              <a:xfrm flipH="1">
+                <a:off x="3810000" y="3339832"/>
+                <a:ext cx="228600" cy="91440"/>
+              </a:xfrm>
+              <a:prstGeom prst="rtTriangle">
+                <a:avLst/>
+              </a:prstGeom>
+              <a:solidFill>
+                <a:srgbClr val="000064"/>
+              </a:solidFill>
+              <a:ln>
+                <a:noFill/>
+              </a:ln>
+            </p:spPr>
+            <p:style>
+              <a:lnRef idx="2">
+                <a:schemeClr val="accent1">
+                  <a:shade val="50000"/>
+                </a:schemeClr>
+              </a:lnRef>
+              <a:fillRef idx="1">
+                <a:schemeClr val="accent1"/>
+              </a:fillRef>
+              <a:effectRef idx="0">
+                <a:schemeClr val="accent1"/>
+              </a:effectRef>
+              <a:fontRef idx="minor">
+                <a:schemeClr val="lt1"/>
+              </a:fontRef>
+            </p:style>
+            <p:txBody>
+              <a:bodyPr rtlCol="0" anchor="ctr"/>
+              <a:lstStyle/>
+              <a:p>
+                <a:pPr algn="ctr"/>
+                <a:endParaRPr lang="en-US"/>
+              </a:p>
+            </p:txBody>
+          </p:sp>
+        </p:grpSp>
+        <p:grpSp>
+          <p:nvGrpSpPr>
+            <p:cNvPr id="16" name="Group 15"/>
+            <p:cNvGrpSpPr/>
+            <p:nvPr/>
+          </p:nvGrpSpPr>
+          <p:grpSpPr>
+            <a:xfrm rot="15300000" flipV="1">
+              <a:off x="492937" y="2062974"/>
+              <a:ext cx="1828800" cy="91440"/>
+              <a:chOff x="838200" y="3339832"/>
+              <a:chExt cx="3200400" cy="91440"/>
+            </a:xfrm>
+          </p:grpSpPr>
+          <p:sp>
+            <p:nvSpPr>
+              <p:cNvPr id="18" name="Rectangle 17"/>
+              <p:cNvSpPr/>
+              <p:nvPr/>
+            </p:nvSpPr>
+            <p:spPr>
+              <a:xfrm>
+                <a:off x="838200" y="3339832"/>
+                <a:ext cx="3200400" cy="91440"/>
+              </a:xfrm>
+              <a:prstGeom prst="rect">
+                <a:avLst/>
+              </a:prstGeom>
+              <a:solidFill>
+                <a:schemeClr val="bg1"/>
+              </a:solidFill>
+              <a:ln>
+                <a:noFill/>
+              </a:ln>
+            </p:spPr>
+            <p:style>
+              <a:lnRef idx="2">
+                <a:schemeClr val="accent1">
+                  <a:shade val="50000"/>
+                </a:schemeClr>
+              </a:lnRef>
+              <a:fillRef idx="1">
+                <a:schemeClr val="accent1"/>
+              </a:fillRef>
+              <a:effectRef idx="0">
+                <a:schemeClr val="accent1"/>
+              </a:effectRef>
+              <a:fontRef idx="minor">
+                <a:schemeClr val="lt1"/>
+              </a:fontRef>
+            </p:style>
+            <p:txBody>
+              <a:bodyPr rtlCol="0" anchor="ctr"/>
+              <a:lstStyle/>
+              <a:p>
+                <a:pPr algn="ctr"/>
+                <a:endParaRPr lang="en-US"/>
+              </a:p>
+            </p:txBody>
+          </p:sp>
+          <p:sp>
+            <p:nvSpPr>
+              <p:cNvPr id="21" name="Right Triangle 20"/>
+              <p:cNvSpPr/>
+              <p:nvPr/>
+            </p:nvSpPr>
+            <p:spPr>
+              <a:xfrm flipH="1">
+                <a:off x="3810000" y="3339832"/>
+                <a:ext cx="228600" cy="91440"/>
+              </a:xfrm>
+              <a:prstGeom prst="rtTriangle">
+                <a:avLst/>
+              </a:prstGeom>
+              <a:solidFill>
+                <a:srgbClr val="000064"/>
+              </a:solidFill>
+              <a:ln>
+                <a:solidFill>
+                  <a:srgbClr val="000064"/>
+                </a:solidFill>
+              </a:ln>
+            </p:spPr>
+            <p:style>
+              <a:lnRef idx="2">
+                <a:schemeClr val="accent1">
+                  <a:shade val="50000"/>
+                </a:schemeClr>
+              </a:lnRef>
+              <a:fillRef idx="1">
+                <a:schemeClr val="accent1"/>
+              </a:fillRef>
+              <a:effectRef idx="0">
+                <a:schemeClr val="accent1"/>
+              </a:effectRef>
+              <a:fontRef idx="minor">
+                <a:schemeClr val="lt1"/>
+              </a:fontRef>
+            </p:style>
+            <p:txBody>
+              <a:bodyPr rtlCol="0" anchor="ctr"/>
+              <a:lstStyle/>
+              <a:p>
+                <a:pPr algn="ctr"/>
+                <a:endParaRPr lang="en-US"/>
+              </a:p>
+            </p:txBody>
+          </p:sp>
+        </p:grpSp>
+        <p:grpSp>
+          <p:nvGrpSpPr>
+            <p:cNvPr id="46" name="Group 45"/>
+            <p:cNvGrpSpPr/>
+            <p:nvPr/>
+          </p:nvGrpSpPr>
+          <p:grpSpPr>
+            <a:xfrm>
+              <a:off x="1670066" y="2971766"/>
+              <a:ext cx="64008" cy="64008"/>
+              <a:chOff x="1373545" y="2366488"/>
+              <a:chExt cx="64008" cy="64008"/>
+            </a:xfrm>
+          </p:grpSpPr>
+          <p:sp>
+            <p:nvSpPr>
+              <p:cNvPr id="9" name="Oval 8"/>
+              <p:cNvSpPr/>
+              <p:nvPr/>
+            </p:nvSpPr>
+            <p:spPr>
+              <a:xfrm>
+                <a:off x="1373545" y="2366488"/>
+                <a:ext cx="64008" cy="64008"/>
+              </a:xfrm>
+              <a:prstGeom prst="ellipse">
+                <a:avLst/>
+              </a:prstGeom>
+              <a:solidFill>
+                <a:srgbClr val="000064"/>
+              </a:solidFill>
+              <a:ln>
+                <a:noFill/>
+              </a:ln>
+            </p:spPr>
+            <p:style>
+              <a:lnRef idx="2">
+                <a:schemeClr val="accent1">
+                  <a:shade val="50000"/>
+                </a:schemeClr>
+              </a:lnRef>
+              <a:fillRef idx="1">
+                <a:schemeClr val="accent1"/>
+              </a:fillRef>
+              <a:effectRef idx="0">
+                <a:schemeClr val="accent1"/>
+              </a:effectRef>
+              <a:fontRef idx="minor">
+                <a:schemeClr val="lt1"/>
+              </a:fontRef>
+            </p:style>
+            <p:txBody>
+              <a:bodyPr rtlCol="0" anchor="ctr"/>
+              <a:lstStyle/>
+              <a:p>
+                <a:pPr algn="ctr"/>
+                <a:endParaRPr lang="en-US"/>
+              </a:p>
+            </p:txBody>
+          </p:sp>
+          <p:sp>
+            <p:nvSpPr>
+              <p:cNvPr id="24" name="Oval 23"/>
+              <p:cNvSpPr/>
+              <p:nvPr/>
+            </p:nvSpPr>
+            <p:spPr>
+              <a:xfrm>
+                <a:off x="1396405" y="2389348"/>
+                <a:ext cx="18288" cy="18288"/>
+              </a:xfrm>
+              <a:prstGeom prst="ellipse">
+                <a:avLst/>
+              </a:prstGeom>
+              <a:solidFill>
+                <a:schemeClr val="bg1"/>
+              </a:solidFill>
+              <a:ln>
+                <a:noFill/>
+              </a:ln>
+            </p:spPr>
+            <p:style>
+              <a:lnRef idx="2">
+                <a:schemeClr val="accent1">
+                  <a:shade val="50000"/>
+                </a:schemeClr>
+              </a:lnRef>
+              <a:fillRef idx="1">
+                <a:schemeClr val="accent1"/>
+              </a:fillRef>
+              <a:effectRef idx="0">
+                <a:schemeClr val="accent1"/>
+              </a:effectRef>
+              <a:fontRef idx="minor">
+                <a:schemeClr val="lt1"/>
+              </a:fontRef>
+            </p:style>
+            <p:txBody>
+              <a:bodyPr rtlCol="0" anchor="ctr"/>
+              <a:lstStyle/>
+              <a:p>
+                <a:pPr algn="ctr"/>
+                <a:endParaRPr lang="en-US"/>
+              </a:p>
+            </p:txBody>
+          </p:sp>
+        </p:grpSp>
+        <p:grpSp>
+          <p:nvGrpSpPr>
+            <p:cNvPr id="36" name="Group 35"/>
+            <p:cNvGrpSpPr/>
+            <p:nvPr/>
+          </p:nvGrpSpPr>
+          <p:grpSpPr>
+            <a:xfrm>
+              <a:off x="2299790" y="2980909"/>
+              <a:ext cx="91440" cy="45719"/>
+              <a:chOff x="2248575" y="2976338"/>
+              <a:chExt cx="91440" cy="45719"/>
+            </a:xfrm>
+          </p:grpSpPr>
+          <p:sp>
+            <p:nvSpPr>
+              <p:cNvPr id="25" name="Rectangle 24"/>
+              <p:cNvSpPr/>
+              <p:nvPr/>
+            </p:nvSpPr>
+            <p:spPr>
+              <a:xfrm>
+                <a:off x="2248575" y="2976338"/>
+                <a:ext cx="91440" cy="45719"/>
+              </a:xfrm>
+              <a:prstGeom prst="rect">
+                <a:avLst/>
+              </a:prstGeom>
+              <a:solidFill>
+                <a:srgbClr val="000064"/>
+              </a:solidFill>
+              <a:ln>
+                <a:noFill/>
+              </a:ln>
+            </p:spPr>
+            <p:style>
+              <a:lnRef idx="2">
+                <a:schemeClr val="accent1">
+                  <a:shade val="50000"/>
+                </a:schemeClr>
+              </a:lnRef>
+              <a:fillRef idx="1">
+                <a:schemeClr val="accent1"/>
+              </a:fillRef>
+              <a:effectRef idx="0">
+                <a:schemeClr val="accent1"/>
+              </a:effectRef>
+              <a:fontRef idx="minor">
+                <a:schemeClr val="lt1"/>
+              </a:fontRef>
+            </p:style>
+            <p:txBody>
+              <a:bodyPr rtlCol="0" anchor="ctr"/>
+              <a:lstStyle/>
+              <a:p>
+                <a:pPr algn="ctr"/>
+                <a:endParaRPr lang="en-US"/>
+              </a:p>
+            </p:txBody>
+          </p:sp>
+          <p:sp>
+            <p:nvSpPr>
+              <p:cNvPr id="26" name="Rectangle 25"/>
+              <p:cNvSpPr/>
+              <p:nvPr/>
+            </p:nvSpPr>
+            <p:spPr>
+              <a:xfrm>
+                <a:off x="2257719" y="2999197"/>
+                <a:ext cx="73152" cy="9144"/>
+              </a:xfrm>
+              <a:prstGeom prst="rect">
+                <a:avLst/>
+              </a:prstGeom>
+              <a:solidFill>
+                <a:schemeClr val="bg1"/>
+              </a:solidFill>
+              <a:ln>
+                <a:noFill/>
+              </a:ln>
+            </p:spPr>
+            <p:style>
+              <a:lnRef idx="2">
+                <a:schemeClr val="accent1">
+                  <a:shade val="50000"/>
+                </a:schemeClr>
+              </a:lnRef>
+              <a:fillRef idx="1">
+                <a:schemeClr val="accent1"/>
+              </a:fillRef>
+              <a:effectRef idx="0">
+                <a:schemeClr val="accent1"/>
+              </a:effectRef>
+              <a:fontRef idx="minor">
+                <a:schemeClr val="lt1"/>
+              </a:fontRef>
+            </p:style>
+            <p:txBody>
+              <a:bodyPr rtlCol="0" anchor="ctr"/>
+              <a:lstStyle/>
+              <a:p>
+                <a:pPr algn="ctr"/>
+                <a:endParaRPr lang="en-US"/>
+              </a:p>
+            </p:txBody>
+          </p:sp>
+        </p:grpSp>
+        <p:grpSp>
+          <p:nvGrpSpPr>
+            <p:cNvPr id="45" name="Group 44"/>
+            <p:cNvGrpSpPr/>
+            <p:nvPr/>
+          </p:nvGrpSpPr>
+          <p:grpSpPr>
+            <a:xfrm>
+              <a:off x="1996869" y="2980910"/>
+              <a:ext cx="118872" cy="45720"/>
+              <a:chOff x="1945705" y="2972362"/>
+              <a:chExt cx="118872" cy="45720"/>
+            </a:xfrm>
+          </p:grpSpPr>
+          <p:sp>
+            <p:nvSpPr>
+              <p:cNvPr id="32" name="Snip Same Side Corner Rectangle 31"/>
+              <p:cNvSpPr/>
+              <p:nvPr/>
+            </p:nvSpPr>
+            <p:spPr>
+              <a:xfrm flipV="1">
+                <a:off x="1945705" y="2972362"/>
+                <a:ext cx="118872" cy="45720"/>
+              </a:xfrm>
+              <a:prstGeom prst="snip2SameRect">
+                <a:avLst>
+                  <a:gd name="adj1" fmla="val 41844"/>
+                  <a:gd name="adj2" fmla="val 0"/>
+                </a:avLst>
+              </a:prstGeom>
+              <a:solidFill>
+                <a:srgbClr val="000064"/>
+              </a:solidFill>
+              <a:ln>
+                <a:noFill/>
+              </a:ln>
+            </p:spPr>
+            <p:style>
+              <a:lnRef idx="2">
+                <a:schemeClr val="accent1">
+                  <a:shade val="50000"/>
+                </a:schemeClr>
+              </a:lnRef>
+              <a:fillRef idx="1">
+                <a:schemeClr val="accent1"/>
+              </a:fillRef>
+              <a:effectRef idx="0">
+                <a:schemeClr val="accent1"/>
+              </a:effectRef>
+              <a:fontRef idx="minor">
+                <a:schemeClr val="lt1"/>
+              </a:fontRef>
+            </p:style>
+            <p:txBody>
+              <a:bodyPr rtlCol="0" anchor="ctr"/>
+              <a:lstStyle/>
+              <a:p>
+                <a:pPr algn="ctr"/>
+                <a:endParaRPr lang="en-US"/>
+              </a:p>
+            </p:txBody>
+          </p:sp>
+          <p:sp>
+            <p:nvSpPr>
+              <p:cNvPr id="44" name="Rectangle 43"/>
+              <p:cNvSpPr/>
+              <p:nvPr/>
+            </p:nvSpPr>
+            <p:spPr>
+              <a:xfrm>
+                <a:off x="1959421" y="2990650"/>
+                <a:ext cx="91440" cy="9144"/>
+              </a:xfrm>
+              <a:prstGeom prst="rect">
+                <a:avLst/>
+              </a:prstGeom>
+              <a:solidFill>
+                <a:schemeClr val="bg1"/>
+              </a:solidFill>
+              <a:ln>
+                <a:noFill/>
+              </a:ln>
+            </p:spPr>
+            <p:style>
+              <a:lnRef idx="2">
+                <a:schemeClr val="accent1">
+                  <a:shade val="50000"/>
+                </a:schemeClr>
+              </a:lnRef>
+              <a:fillRef idx="1">
+                <a:schemeClr val="accent1"/>
+              </a:fillRef>
+              <a:effectRef idx="0">
+                <a:schemeClr val="accent1"/>
+              </a:effectRef>
+              <a:fontRef idx="minor">
+                <a:schemeClr val="lt1"/>
+              </a:fontRef>
+            </p:style>
+            <p:txBody>
+              <a:bodyPr rtlCol="0" anchor="ctr"/>
+              <a:lstStyle/>
+              <a:p>
+                <a:pPr algn="ctr"/>
+                <a:endParaRPr lang="en-US"/>
+              </a:p>
+            </p:txBody>
+          </p:sp>
+        </p:grpSp>
+        <p:grpSp>
+          <p:nvGrpSpPr>
+            <p:cNvPr id="56" name="Group 55"/>
+            <p:cNvGrpSpPr/>
+            <p:nvPr/>
+          </p:nvGrpSpPr>
+          <p:grpSpPr>
+            <a:xfrm>
+              <a:off x="2439141" y="2980908"/>
+              <a:ext cx="91440" cy="45719"/>
+              <a:chOff x="2248575" y="2976338"/>
+              <a:chExt cx="91440" cy="45719"/>
+            </a:xfrm>
+          </p:grpSpPr>
+          <p:sp>
+            <p:nvSpPr>
+              <p:cNvPr id="57" name="Rectangle 56"/>
+              <p:cNvSpPr/>
+              <p:nvPr/>
+            </p:nvSpPr>
+            <p:spPr>
+              <a:xfrm>
+                <a:off x="2248575" y="2976338"/>
+                <a:ext cx="91440" cy="45719"/>
+              </a:xfrm>
+              <a:prstGeom prst="rect">
+                <a:avLst/>
+              </a:prstGeom>
+              <a:solidFill>
+                <a:srgbClr val="000064"/>
+              </a:solidFill>
+              <a:ln>
+                <a:noFill/>
+              </a:ln>
+            </p:spPr>
+            <p:style>
+              <a:lnRef idx="2">
+                <a:schemeClr val="accent1">
+                  <a:shade val="50000"/>
+                </a:schemeClr>
+              </a:lnRef>
+              <a:fillRef idx="1">
+                <a:schemeClr val="accent1"/>
+              </a:fillRef>
+              <a:effectRef idx="0">
+                <a:schemeClr val="accent1"/>
+              </a:effectRef>
+              <a:fontRef idx="minor">
+                <a:schemeClr val="lt1"/>
+              </a:fontRef>
+            </p:style>
+            <p:txBody>
+              <a:bodyPr rtlCol="0" anchor="ctr"/>
+              <a:lstStyle/>
+              <a:p>
+                <a:pPr algn="ctr"/>
+                <a:endParaRPr lang="en-US"/>
+              </a:p>
+            </p:txBody>
+          </p:sp>
+          <p:sp>
+            <p:nvSpPr>
+              <p:cNvPr id="58" name="Rectangle 57"/>
+              <p:cNvSpPr/>
+              <p:nvPr/>
+            </p:nvSpPr>
+            <p:spPr>
+              <a:xfrm>
+                <a:off x="2257719" y="2999197"/>
+                <a:ext cx="73152" cy="9144"/>
+              </a:xfrm>
+              <a:prstGeom prst="rect">
+                <a:avLst/>
+              </a:prstGeom>
+              <a:solidFill>
+                <a:schemeClr val="bg1"/>
+              </a:solidFill>
+              <a:ln>
+                <a:noFill/>
+              </a:ln>
+            </p:spPr>
+            <p:style>
+              <a:lnRef idx="2">
+                <a:schemeClr val="accent1">
+                  <a:shade val="50000"/>
+                </a:schemeClr>
+              </a:lnRef>
+              <a:fillRef idx="1">
+                <a:schemeClr val="accent1"/>
+              </a:fillRef>
+              <a:effectRef idx="0">
+                <a:schemeClr val="accent1"/>
+              </a:effectRef>
+              <a:fontRef idx="minor">
+                <a:schemeClr val="lt1"/>
+              </a:fontRef>
+            </p:style>
+            <p:txBody>
+              <a:bodyPr rtlCol="0" anchor="ctr"/>
+              <a:lstStyle/>
+              <a:p>
+                <a:pPr algn="ctr"/>
+                <a:endParaRPr lang="en-US"/>
+              </a:p>
+            </p:txBody>
+          </p:sp>
+        </p:grpSp>
+        <p:grpSp>
+          <p:nvGrpSpPr>
+            <p:cNvPr id="59" name="Group 58"/>
+            <p:cNvGrpSpPr/>
+            <p:nvPr/>
+          </p:nvGrpSpPr>
+          <p:grpSpPr>
+            <a:xfrm>
+              <a:off x="2166012" y="2980908"/>
+              <a:ext cx="91440" cy="45719"/>
+              <a:chOff x="2248575" y="2976338"/>
+              <a:chExt cx="91440" cy="45719"/>
+            </a:xfrm>
+          </p:grpSpPr>
+          <p:sp>
+            <p:nvSpPr>
+              <p:cNvPr id="60" name="Rectangle 59"/>
+              <p:cNvSpPr/>
+              <p:nvPr/>
+            </p:nvSpPr>
+            <p:spPr>
+              <a:xfrm>
+                <a:off x="2248575" y="2976338"/>
+                <a:ext cx="91440" cy="45719"/>
+              </a:xfrm>
+              <a:prstGeom prst="rect">
+                <a:avLst/>
+              </a:prstGeom>
+              <a:solidFill>
+                <a:srgbClr val="000064"/>
+              </a:solidFill>
+              <a:ln>
+                <a:noFill/>
+              </a:ln>
+            </p:spPr>
+            <p:style>
+              <a:lnRef idx="2">
+                <a:schemeClr val="accent1">
+                  <a:shade val="50000"/>
+                </a:schemeClr>
+              </a:lnRef>
+              <a:fillRef idx="1">
+                <a:schemeClr val="accent1"/>
+              </a:fillRef>
+              <a:effectRef idx="0">
+                <a:schemeClr val="accent1"/>
+              </a:effectRef>
+              <a:fontRef idx="minor">
+                <a:schemeClr val="lt1"/>
+              </a:fontRef>
+            </p:style>
+            <p:txBody>
+              <a:bodyPr rtlCol="0" anchor="ctr"/>
+              <a:lstStyle/>
+              <a:p>
+                <a:pPr algn="ctr"/>
+                <a:endParaRPr lang="en-US"/>
+              </a:p>
+            </p:txBody>
+          </p:sp>
+          <p:sp>
+            <p:nvSpPr>
+              <p:cNvPr id="61" name="Rectangle 60"/>
+              <p:cNvSpPr/>
+              <p:nvPr/>
+            </p:nvSpPr>
+            <p:spPr>
+              <a:xfrm>
+                <a:off x="2257719" y="2999197"/>
+                <a:ext cx="73152" cy="9144"/>
+              </a:xfrm>
+              <a:prstGeom prst="rect">
+                <a:avLst/>
+              </a:prstGeom>
+              <a:solidFill>
+                <a:schemeClr val="bg1"/>
+              </a:solidFill>
+              <a:ln>
+                <a:noFill/>
+              </a:ln>
+            </p:spPr>
+            <p:style>
+              <a:lnRef idx="2">
+                <a:schemeClr val="accent1">
+                  <a:shade val="50000"/>
+                </a:schemeClr>
+              </a:lnRef>
+              <a:fillRef idx="1">
+                <a:schemeClr val="accent1"/>
+              </a:fillRef>
+              <a:effectRef idx="0">
+                <a:schemeClr val="accent1"/>
+              </a:effectRef>
+              <a:fontRef idx="minor">
+                <a:schemeClr val="lt1"/>
+              </a:fontRef>
+            </p:style>
+            <p:txBody>
+              <a:bodyPr rtlCol="0" anchor="ctr"/>
+              <a:lstStyle/>
+              <a:p>
+                <a:pPr algn="ctr"/>
+                <a:endParaRPr lang="en-US"/>
+              </a:p>
+            </p:txBody>
+          </p:sp>
+        </p:grpSp>
+      </p:grpSp>
+    </p:spTree>
+    <p:extLst>
+      <p:ext uri="{BB962C8B-B14F-4D97-AF65-F5344CB8AC3E}">
+        <p14:creationId xmlns:p14="http://schemas.microsoft.com/office/powerpoint/2010/main" val="2274529631"/>
+      </p:ext>
+    </p:extLst>
+  </p:cSld>
+  <p:clrMapOvr>
+    <a:masterClrMapping/>
+  </p:clrMapOvr>
+</p:sld>
+</file>
+
+<file path=ppt/slides/slide6.xml><?xml version="1.0" encoding="utf-8"?>
+<p:sld xmlns:a="http://schemas.openxmlformats.org/drawingml/2006/main" xmlns:r="http://schemas.openxmlformats.org/officeDocument/2006/relationships" xmlns:p="http://schemas.openxmlformats.org/presentationml/2006/main">
+  <p:cSld>
+    <p:spTree>
+      <p:nvGrpSpPr>
+        <p:cNvPr id="1" name=""/>
+        <p:cNvGrpSpPr/>
+        <p:nvPr/>
+      </p:nvGrpSpPr>
+      <p:grpSpPr>
+        <a:xfrm>
+          <a:off x="0" y="0"/>
+          <a:ext cx="0" cy="0"/>
+          <a:chOff x="0" y="0"/>
+          <a:chExt cx="0" cy="0"/>
+        </a:xfrm>
+      </p:grpSpPr>
+      <p:sp>
+        <p:nvSpPr>
+          <p:cNvPr id="8" name="Rectangle 7"/>
+          <p:cNvSpPr/>
+          <p:nvPr/>
+        </p:nvSpPr>
+        <p:spPr>
+          <a:xfrm>
+            <a:off x="0" y="0"/>
+            <a:ext cx="4572000" cy="4572000"/>
+          </a:xfrm>
+          <a:prstGeom prst="rect">
+            <a:avLst/>
+          </a:prstGeom>
+          <a:solidFill>
+            <a:srgbClr val="000064"/>
+          </a:solidFill>
+          <a:ln>
+            <a:solidFill>
+              <a:srgbClr val="000064"/>
+            </a:solidFill>
+          </a:ln>
+        </p:spPr>
+        <p:style>
+          <a:lnRef idx="2">
+            <a:schemeClr val="accent1">
+              <a:shade val="50000"/>
+            </a:schemeClr>
+          </a:lnRef>
+          <a:fillRef idx="1">
+            <a:schemeClr val="accent1"/>
+          </a:fillRef>
+          <a:effectRef idx="0">
+            <a:schemeClr val="accent1"/>
+          </a:effectRef>
+          <a:fontRef idx="minor">
+            <a:schemeClr val="lt1"/>
+          </a:fontRef>
+        </p:style>
+        <p:txBody>
+          <a:bodyPr rtlCol="0" anchor="ctr"/>
+          <a:lstStyle/>
+          <a:p>
+            <a:pPr algn="ctr"/>
+            <a:endParaRPr lang="en-US"/>
+          </a:p>
+        </p:txBody>
+      </p:sp>
+      <p:sp>
+        <p:nvSpPr>
+          <p:cNvPr id="2" name="Rounded Rectangle 1"/>
+          <p:cNvSpPr/>
+          <p:nvPr/>
+        </p:nvSpPr>
+        <p:spPr>
+          <a:xfrm>
+            <a:off x="1485900" y="800100"/>
+            <a:ext cx="1600200" cy="2971800"/>
+          </a:xfrm>
+          <a:prstGeom prst="roundRect">
+            <a:avLst>
+              <a:gd name="adj" fmla="val 4312"/>
+            </a:avLst>
+          </a:prstGeom>
+          <a:solidFill>
+            <a:schemeClr val="bg1"/>
+          </a:solidFill>
+          <a:ln>
+            <a:solidFill>
+              <a:srgbClr val="000064"/>
+            </a:solidFill>
+          </a:ln>
+        </p:spPr>
+        <p:style>
+          <a:lnRef idx="2">
+            <a:schemeClr val="accent1">
+              <a:shade val="50000"/>
+            </a:schemeClr>
+          </a:lnRef>
+          <a:fillRef idx="1">
+            <a:schemeClr val="accent1"/>
+          </a:fillRef>
+          <a:effectRef idx="0">
+            <a:schemeClr val="accent1"/>
+          </a:effectRef>
+          <a:fontRef idx="minor">
+            <a:schemeClr val="lt1"/>
+          </a:fontRef>
+        </p:style>
+        <p:txBody>
+          <a:bodyPr rtlCol="0" anchor="ctr"/>
+          <a:lstStyle/>
+          <a:p>
+            <a:pPr algn="ctr"/>
+            <a:endParaRPr lang="en-US"/>
+          </a:p>
+        </p:txBody>
+      </p:sp>
+      <p:sp>
+        <p:nvSpPr>
+          <p:cNvPr id="3" name="Rectangle 2"/>
+          <p:cNvSpPr/>
+          <p:nvPr/>
+        </p:nvSpPr>
+        <p:spPr>
+          <a:xfrm>
+            <a:off x="1600200" y="1028700"/>
+            <a:ext cx="1371600" cy="2514600"/>
+          </a:xfrm>
+          <a:prstGeom prst="rect">
+            <a:avLst/>
+          </a:prstGeom>
+          <a:solidFill>
+            <a:srgbClr val="000064"/>
+          </a:solidFill>
+          <a:ln>
+            <a:solidFill>
+              <a:schemeClr val="bg1"/>
+            </a:solidFill>
+          </a:ln>
+        </p:spPr>
+        <p:style>
+          <a:lnRef idx="2">
+            <a:schemeClr val="accent1">
+              <a:shade val="50000"/>
+            </a:schemeClr>
+          </a:lnRef>
+          <a:fillRef idx="1">
+            <a:schemeClr val="accent1"/>
+          </a:fillRef>
+          <a:effectRef idx="0">
+            <a:schemeClr val="accent1"/>
+          </a:effectRef>
+          <a:fontRef idx="minor">
+            <a:schemeClr val="lt1"/>
+          </a:fontRef>
+        </p:style>
+        <p:txBody>
+          <a:bodyPr rtlCol="0" anchor="ctr"/>
+          <a:lstStyle/>
+          <a:p>
+            <a:pPr algn="ctr"/>
+            <a:endParaRPr lang="en-US"/>
+          </a:p>
+        </p:txBody>
+      </p:sp>
+      <p:sp>
+        <p:nvSpPr>
+          <p:cNvPr id="5" name="Rounded Rectangle 4"/>
+          <p:cNvSpPr/>
+          <p:nvPr/>
+        </p:nvSpPr>
+        <p:spPr>
+          <a:xfrm>
+            <a:off x="2171700" y="3589020"/>
+            <a:ext cx="228600" cy="137160"/>
+          </a:xfrm>
+          <a:prstGeom prst="roundRect">
+            <a:avLst/>
+          </a:prstGeom>
+          <a:solidFill>
+            <a:srgbClr val="000064"/>
+          </a:solidFill>
+          <a:ln>
+            <a:noFill/>
+          </a:ln>
+        </p:spPr>
+        <p:style>
+          <a:lnRef idx="2">
+            <a:schemeClr val="accent1">
+              <a:shade val="50000"/>
+            </a:schemeClr>
+          </a:lnRef>
+          <a:fillRef idx="1">
+            <a:schemeClr val="accent1"/>
+          </a:fillRef>
+          <a:effectRef idx="0">
+            <a:schemeClr val="accent1"/>
+          </a:effectRef>
+          <a:fontRef idx="minor">
+            <a:schemeClr val="lt1"/>
+          </a:fontRef>
+        </p:style>
+        <p:txBody>
+          <a:bodyPr rtlCol="0" anchor="ctr"/>
+          <a:lstStyle/>
+          <a:p>
+            <a:pPr algn="ctr"/>
+            <a:endParaRPr lang="en-US"/>
+          </a:p>
+        </p:txBody>
+      </p:sp>
+      <p:sp>
+        <p:nvSpPr>
+          <p:cNvPr id="6" name="Oval 5"/>
+          <p:cNvSpPr/>
+          <p:nvPr/>
+        </p:nvSpPr>
+        <p:spPr>
+          <a:xfrm>
+            <a:off x="2515630" y="868680"/>
+            <a:ext cx="91440" cy="91440"/>
+          </a:xfrm>
+          <a:prstGeom prst="ellipse">
+            <a:avLst/>
+          </a:prstGeom>
+          <a:solidFill>
+            <a:srgbClr val="000064"/>
+          </a:solidFill>
+          <a:ln>
+            <a:noFill/>
+          </a:ln>
+        </p:spPr>
+        <p:style>
+          <a:lnRef idx="2">
+            <a:schemeClr val="accent1">
+              <a:shade val="50000"/>
+            </a:schemeClr>
+          </a:lnRef>
+          <a:fillRef idx="1">
+            <a:schemeClr val="accent1"/>
+          </a:fillRef>
+          <a:effectRef idx="0">
+            <a:schemeClr val="accent1"/>
+          </a:effectRef>
+          <a:fontRef idx="minor">
+            <a:schemeClr val="lt1"/>
+          </a:fontRef>
+        </p:style>
+        <p:txBody>
+          <a:bodyPr rtlCol="0" anchor="ctr"/>
+          <a:lstStyle/>
+          <a:p>
+            <a:pPr algn="ctr"/>
+            <a:endParaRPr lang="en-US"/>
+          </a:p>
+        </p:txBody>
+      </p:sp>
+      <p:sp>
+        <p:nvSpPr>
+          <p:cNvPr id="7" name="Rounded Rectangle 6"/>
+          <p:cNvSpPr/>
+          <p:nvPr/>
+        </p:nvSpPr>
+        <p:spPr>
+          <a:xfrm>
+            <a:off x="2217420" y="891540"/>
+            <a:ext cx="137160" cy="45719"/>
+          </a:xfrm>
+          <a:prstGeom prst="roundRect">
+            <a:avLst>
+              <a:gd name="adj" fmla="val 38584"/>
+            </a:avLst>
+          </a:prstGeom>
+          <a:solidFill>
+            <a:srgbClr val="000064"/>
+          </a:solidFill>
+          <a:ln>
+            <a:noFill/>
+          </a:ln>
+        </p:spPr>
+        <p:style>
+          <a:lnRef idx="2">
+            <a:schemeClr val="accent1">
+              <a:shade val="50000"/>
+            </a:schemeClr>
+          </a:lnRef>
+          <a:fillRef idx="1">
+            <a:schemeClr val="accent1"/>
+          </a:fillRef>
+          <a:effectRef idx="0">
+            <a:schemeClr val="accent1"/>
+          </a:effectRef>
+          <a:fontRef idx="minor">
+            <a:schemeClr val="lt1"/>
+          </a:fontRef>
+        </p:style>
+        <p:txBody>
+          <a:bodyPr rtlCol="0" anchor="ctr"/>
+          <a:lstStyle/>
+          <a:p>
+            <a:pPr algn="ctr"/>
+            <a:endParaRPr lang="en-US"/>
+          </a:p>
+        </p:txBody>
+      </p:sp>
+    </p:spTree>
+    <p:extLst>
+      <p:ext uri="{BB962C8B-B14F-4D97-AF65-F5344CB8AC3E}">
+        <p14:creationId xmlns:p14="http://schemas.microsoft.com/office/powerpoint/2010/main" val="2775428243"/>
+      </p:ext>
+    </p:extLst>
+  </p:cSld>
+  <p:clrMapOvr>
+    <a:masterClrMapping/>
+  </p:clrMapOvr>
+  <p:timing>
+    <p:tnLst>
+      <p:par>
+        <p:cTn id="1" dur="indefinite" restart="never" nodeType="tmRoot"/>
+      </p:par>
+    </p:tnLst>
+  </p:timing>
+</p:sld>
+</file>
+
+<file path=ppt/slides/slide7.xml><?xml version="1.0" encoding="utf-8"?>
+<p:sld xmlns:a="http://schemas.openxmlformats.org/drawingml/2006/main" xmlns:r="http://schemas.openxmlformats.org/officeDocument/2006/relationships" xmlns:p="http://schemas.openxmlformats.org/presentationml/2006/main">
+  <p:cSld>
+    <p:spTree>
+      <p:nvGrpSpPr>
+        <p:cNvPr id="1" name=""/>
+        <p:cNvGrpSpPr/>
+        <p:nvPr/>
+      </p:nvGrpSpPr>
+      <p:grpSpPr>
+        <a:xfrm>
+          <a:off x="0" y="0"/>
+          <a:ext cx="0" cy="0"/>
+          <a:chOff x="0" y="0"/>
+          <a:chExt cx="0" cy="0"/>
+        </a:xfrm>
+      </p:grpSpPr>
+      <p:sp>
+        <p:nvSpPr>
+          <p:cNvPr id="7" name="Rectangle 6"/>
+          <p:cNvSpPr/>
+          <p:nvPr/>
+        </p:nvSpPr>
+        <p:spPr>
+          <a:xfrm>
+            <a:off x="-1" y="0"/>
+            <a:ext cx="4572000" cy="4572000"/>
+          </a:xfrm>
+          <a:prstGeom prst="rect">
+            <a:avLst/>
+          </a:prstGeom>
+          <a:solidFill>
+            <a:srgbClr val="000064"/>
+          </a:solidFill>
+          <a:ln>
+            <a:solidFill>
+              <a:srgbClr val="000064"/>
+            </a:solidFill>
+          </a:ln>
+        </p:spPr>
+        <p:style>
+          <a:lnRef idx="2">
+            <a:schemeClr val="accent1">
+              <a:shade val="50000"/>
+            </a:schemeClr>
+          </a:lnRef>
+          <a:fillRef idx="1">
+            <a:schemeClr val="accent1"/>
+          </a:fillRef>
+          <a:effectRef idx="0">
+            <a:schemeClr val="accent1"/>
+          </a:effectRef>
+          <a:fontRef idx="minor">
+            <a:schemeClr val="lt1"/>
+          </a:fontRef>
+        </p:style>
+        <p:txBody>
+          <a:bodyPr rtlCol="0" anchor="ctr"/>
+          <a:lstStyle/>
+          <a:p>
+            <a:pPr algn="ctr"/>
+            <a:endParaRPr lang="en-US"/>
+          </a:p>
+        </p:txBody>
+      </p:sp>
+      <p:sp>
+        <p:nvSpPr>
+          <p:cNvPr id="2" name="Rounded Rectangle 1"/>
+          <p:cNvSpPr/>
+          <p:nvPr/>
+        </p:nvSpPr>
+        <p:spPr>
+          <a:xfrm>
+            <a:off x="685800" y="1371600"/>
+            <a:ext cx="3200400" cy="1828800"/>
+          </a:xfrm>
+          <a:prstGeom prst="roundRect">
+            <a:avLst>
+              <a:gd name="adj" fmla="val 3419"/>
+            </a:avLst>
+          </a:prstGeom>
+          <a:solidFill>
+            <a:schemeClr val="bg1"/>
+          </a:solidFill>
+          <a:ln>
+            <a:solidFill>
+              <a:schemeClr val="bg1"/>
+            </a:solidFill>
+          </a:ln>
+        </p:spPr>
+        <p:style>
+          <a:lnRef idx="2">
+            <a:schemeClr val="accent1">
+              <a:shade val="50000"/>
+            </a:schemeClr>
+          </a:lnRef>
+          <a:fillRef idx="1">
+            <a:schemeClr val="accent1"/>
+          </a:fillRef>
+          <a:effectRef idx="0">
+            <a:schemeClr val="accent1"/>
+          </a:effectRef>
+          <a:fontRef idx="minor">
+            <a:schemeClr val="lt1"/>
+          </a:fontRef>
+        </p:style>
+        <p:txBody>
+          <a:bodyPr rtlCol="0" anchor="ctr"/>
+          <a:lstStyle/>
+          <a:p>
+            <a:pPr algn="ctr"/>
+            <a:endParaRPr lang="en-US"/>
+          </a:p>
+        </p:txBody>
+      </p:sp>
+      <p:sp>
+        <p:nvSpPr>
+          <p:cNvPr id="3" name="Oval 2"/>
+          <p:cNvSpPr/>
+          <p:nvPr/>
+        </p:nvSpPr>
+        <p:spPr>
+          <a:xfrm>
+            <a:off x="2353963" y="1648389"/>
+            <a:ext cx="1276865" cy="1275222"/>
+          </a:xfrm>
+          <a:prstGeom prst="ellipse">
+            <a:avLst/>
+          </a:prstGeom>
+          <a:solidFill>
+            <a:schemeClr val="bg1"/>
+          </a:solidFill>
+          <a:ln w="127000">
+            <a:solidFill>
+              <a:srgbClr val="000064"/>
+            </a:solidFill>
+          </a:ln>
+        </p:spPr>
+        <p:style>
+          <a:lnRef idx="2">
+            <a:schemeClr val="accent1">
+              <a:shade val="50000"/>
+            </a:schemeClr>
+          </a:lnRef>
+          <a:fillRef idx="1">
+            <a:schemeClr val="accent1"/>
+          </a:fillRef>
+          <a:effectRef idx="0">
+            <a:schemeClr val="accent1"/>
+          </a:effectRef>
+          <a:fontRef idx="minor">
+            <a:schemeClr val="lt1"/>
+          </a:fontRef>
+        </p:style>
+        <p:txBody>
+          <a:bodyPr rtlCol="0" anchor="ctr"/>
+          <a:lstStyle/>
+          <a:p>
+            <a:pPr algn="ctr"/>
+            <a:endParaRPr lang="en-US"/>
+          </a:p>
+        </p:txBody>
+      </p:sp>
+      <p:sp>
+        <p:nvSpPr>
+          <p:cNvPr id="12" name="Oval 11"/>
+          <p:cNvSpPr/>
+          <p:nvPr/>
+        </p:nvSpPr>
+        <p:spPr>
+          <a:xfrm>
+            <a:off x="2154436" y="1516994"/>
+            <a:ext cx="263128" cy="262789"/>
+          </a:xfrm>
+          <a:prstGeom prst="ellipse">
+            <a:avLst/>
+          </a:prstGeom>
+          <a:solidFill>
+            <a:srgbClr val="000064"/>
+          </a:solidFill>
+          <a:ln w="38100">
+            <a:noFill/>
+          </a:ln>
+        </p:spPr>
+        <p:style>
+          <a:lnRef idx="2">
+            <a:schemeClr val="accent1">
+              <a:shade val="50000"/>
+            </a:schemeClr>
+          </a:lnRef>
+          <a:fillRef idx="1">
+            <a:schemeClr val="accent1"/>
+          </a:fillRef>
+          <a:effectRef idx="0">
+            <a:schemeClr val="accent1"/>
+          </a:effectRef>
+          <a:fontRef idx="minor">
+            <a:schemeClr val="lt1"/>
+          </a:fontRef>
+        </p:style>
+        <p:txBody>
+          <a:bodyPr rtlCol="0" anchor="ctr"/>
+          <a:lstStyle/>
+          <a:p>
+            <a:pPr algn="ctr"/>
+            <a:endParaRPr lang="en-US"/>
+          </a:p>
+        </p:txBody>
+      </p:sp>
+      <p:sp>
+        <p:nvSpPr>
+          <p:cNvPr id="13" name="Rounded Rectangle 12"/>
+          <p:cNvSpPr/>
+          <p:nvPr/>
+        </p:nvSpPr>
+        <p:spPr>
+          <a:xfrm>
+            <a:off x="999864" y="1192390"/>
+            <a:ext cx="314064" cy="119473"/>
+          </a:xfrm>
+          <a:prstGeom prst="roundRect">
+            <a:avLst>
+              <a:gd name="adj" fmla="val 6738"/>
+            </a:avLst>
+          </a:prstGeom>
+          <a:solidFill>
+            <a:schemeClr val="bg1"/>
+          </a:solidFill>
+          <a:ln>
+            <a:noFill/>
+          </a:ln>
+        </p:spPr>
+        <p:style>
+          <a:lnRef idx="2">
+            <a:schemeClr val="accent1">
+              <a:shade val="50000"/>
+            </a:schemeClr>
+          </a:lnRef>
+          <a:fillRef idx="1">
+            <a:schemeClr val="accent1"/>
+          </a:fillRef>
+          <a:effectRef idx="0">
+            <a:schemeClr val="accent1"/>
+          </a:effectRef>
+          <a:fontRef idx="minor">
+            <a:schemeClr val="lt1"/>
+          </a:fontRef>
+        </p:style>
+        <p:txBody>
+          <a:bodyPr rtlCol="0" anchor="ctr"/>
+          <a:lstStyle/>
+          <a:p>
+            <a:pPr algn="ctr"/>
+            <a:endParaRPr lang="en-US"/>
+          </a:p>
+        </p:txBody>
+      </p:sp>
+    </p:spTree>
+    <p:extLst>
+      <p:ext uri="{BB962C8B-B14F-4D97-AF65-F5344CB8AC3E}">
+        <p14:creationId xmlns:p14="http://schemas.microsoft.com/office/powerpoint/2010/main" val="561755351"/>
+      </p:ext>
+    </p:extLst>
+  </p:cSld>
+  <p:clrMapOvr>
+    <a:masterClrMapping/>
+  </p:clrMapOvr>
+  <p:timing>
+    <p:tnLst>
+      <p:par>
+        <p:cTn id="1" dur="indefinite" restart="never" nodeType="tmRoot"/>
+      </p:par>
+    </p:tnLst>
+  </p:timing>
+</p:sld>
+</file>
+
+<file path=ppt/slides/slide8.xml><?xml version="1.0" encoding="utf-8"?>
+<p:sld xmlns:a="http://schemas.openxmlformats.org/drawingml/2006/main" xmlns:r="http://schemas.openxmlformats.org/officeDocument/2006/relationships" xmlns:p="http://schemas.openxmlformats.org/presentationml/2006/main">
+  <p:cSld>
+    <p:spTree>
+      <p:nvGrpSpPr>
+        <p:cNvPr id="1" name=""/>
+        <p:cNvGrpSpPr/>
+        <p:nvPr/>
+      </p:nvGrpSpPr>
+      <p:grpSpPr>
+        <a:xfrm>
+          <a:off x="0" y="0"/>
+          <a:ext cx="0" cy="0"/>
+          <a:chOff x="0" y="0"/>
+          <a:chExt cx="0" cy="0"/>
+        </a:xfrm>
+      </p:grpSpPr>
+      <p:sp>
+        <p:nvSpPr>
           <p:cNvPr id="9" name="Rectangle 8"/>
           <p:cNvSpPr/>
           <p:nvPr/>
@@ -4658,7 +7047,7 @@
 </p:sld>
 </file>
 
-<file path=ppt/slides/slide5.xml><?xml version="1.0" encoding="utf-8"?>
+<file path=ppt/slides/slide9.xml><?xml version="1.0" encoding="utf-8"?>
 <p:sld xmlns:a="http://schemas.openxmlformats.org/drawingml/2006/main" xmlns:r="http://schemas.openxmlformats.org/officeDocument/2006/relationships" xmlns:p="http://schemas.openxmlformats.org/presentationml/2006/main">
   <p:cSld>
     <p:spTree>
@@ -4875,1125 +7264,6 @@
     <p:extLst>
       <p:ext uri="{BB962C8B-B14F-4D97-AF65-F5344CB8AC3E}">
         <p14:creationId xmlns:p14="http://schemas.microsoft.com/office/powerpoint/2010/main" val="3926861122"/>
-      </p:ext>
-    </p:extLst>
-  </p:cSld>
-  <p:clrMapOvr>
-    <a:masterClrMapping/>
-  </p:clrMapOvr>
-  <p:timing>
-    <p:tnLst>
-      <p:par>
-        <p:cTn id="1" dur="indefinite" restart="never" nodeType="tmRoot"/>
-      </p:par>
-    </p:tnLst>
-  </p:timing>
-</p:sld>
-</file>
-
-<file path=ppt/slides/slide6.xml><?xml version="1.0" encoding="utf-8"?>
-<p:sld xmlns:a="http://schemas.openxmlformats.org/drawingml/2006/main" xmlns:r="http://schemas.openxmlformats.org/officeDocument/2006/relationships" xmlns:p="http://schemas.openxmlformats.org/presentationml/2006/main">
-  <p:cSld>
-    <p:spTree>
-      <p:nvGrpSpPr>
-        <p:cNvPr id="1" name=""/>
-        <p:cNvGrpSpPr/>
-        <p:nvPr/>
-      </p:nvGrpSpPr>
-      <p:grpSpPr>
-        <a:xfrm>
-          <a:off x="0" y="0"/>
-          <a:ext cx="0" cy="0"/>
-          <a:chOff x="0" y="0"/>
-          <a:chExt cx="0" cy="0"/>
-        </a:xfrm>
-      </p:grpSpPr>
-      <p:sp>
-        <p:nvSpPr>
-          <p:cNvPr id="8" name="Rectangle 7"/>
-          <p:cNvSpPr/>
-          <p:nvPr/>
-        </p:nvSpPr>
-        <p:spPr>
-          <a:xfrm>
-            <a:off x="-1" y="0"/>
-            <a:ext cx="4572000" cy="4572000"/>
-          </a:xfrm>
-          <a:prstGeom prst="rect">
-            <a:avLst/>
-          </a:prstGeom>
-          <a:solidFill>
-            <a:srgbClr val="000064"/>
-          </a:solidFill>
-          <a:ln>
-            <a:solidFill>
-              <a:srgbClr val="000064"/>
-            </a:solidFill>
-          </a:ln>
-        </p:spPr>
-        <p:style>
-          <a:lnRef idx="2">
-            <a:schemeClr val="accent1">
-              <a:shade val="50000"/>
-            </a:schemeClr>
-          </a:lnRef>
-          <a:fillRef idx="1">
-            <a:schemeClr val="accent1"/>
-          </a:fillRef>
-          <a:effectRef idx="0">
-            <a:schemeClr val="accent1"/>
-          </a:effectRef>
-          <a:fontRef idx="minor">
-            <a:schemeClr val="lt1"/>
-          </a:fontRef>
-        </p:style>
-        <p:txBody>
-          <a:bodyPr rtlCol="0" anchor="ctr"/>
-          <a:lstStyle/>
-          <a:p>
-            <a:pPr algn="ctr"/>
-            <a:endParaRPr lang="en-US"/>
-          </a:p>
-        </p:txBody>
-      </p:sp>
-      <p:sp>
-        <p:nvSpPr>
-          <p:cNvPr id="3" name="Rectangle 2"/>
-          <p:cNvSpPr/>
-          <p:nvPr/>
-        </p:nvSpPr>
-        <p:spPr>
-          <a:xfrm>
-            <a:off x="1874520" y="661016"/>
-            <a:ext cx="822960" cy="822960"/>
-          </a:xfrm>
-          <a:prstGeom prst="rect">
-            <a:avLst/>
-          </a:prstGeom>
-          <a:solidFill>
-            <a:schemeClr val="bg1"/>
-          </a:solidFill>
-          <a:ln>
-            <a:noFill/>
-          </a:ln>
-        </p:spPr>
-        <p:style>
-          <a:lnRef idx="2">
-            <a:schemeClr val="accent1">
-              <a:shade val="50000"/>
-            </a:schemeClr>
-          </a:lnRef>
-          <a:fillRef idx="1">
-            <a:schemeClr val="accent1"/>
-          </a:fillRef>
-          <a:effectRef idx="0">
-            <a:schemeClr val="accent1"/>
-          </a:effectRef>
-          <a:fontRef idx="minor">
-            <a:schemeClr val="lt1"/>
-          </a:fontRef>
-        </p:style>
-        <p:txBody>
-          <a:bodyPr rtlCol="0" anchor="ctr"/>
-          <a:lstStyle/>
-          <a:p>
-            <a:pPr algn="ctr"/>
-            <a:endParaRPr lang="en-US"/>
-          </a:p>
-        </p:txBody>
-      </p:sp>
-      <p:sp>
-        <p:nvSpPr>
-          <p:cNvPr id="12" name="Rectangle 11"/>
-          <p:cNvSpPr/>
-          <p:nvPr/>
-        </p:nvSpPr>
-        <p:spPr>
-          <a:xfrm>
-            <a:off x="1600200" y="1770611"/>
-            <a:ext cx="1371600" cy="2518756"/>
-          </a:xfrm>
-          <a:prstGeom prst="rect">
-            <a:avLst/>
-          </a:prstGeom>
-          <a:solidFill>
-            <a:schemeClr val="bg1"/>
-          </a:solidFill>
-          <a:ln>
-            <a:noFill/>
-          </a:ln>
-        </p:spPr>
-        <p:style>
-          <a:lnRef idx="2">
-            <a:schemeClr val="accent1">
-              <a:shade val="50000"/>
-            </a:schemeClr>
-          </a:lnRef>
-          <a:fillRef idx="1">
-            <a:schemeClr val="accent1"/>
-          </a:fillRef>
-          <a:effectRef idx="0">
-            <a:schemeClr val="accent1"/>
-          </a:effectRef>
-          <a:fontRef idx="minor">
-            <a:schemeClr val="lt1"/>
-          </a:fontRef>
-        </p:style>
-        <p:txBody>
-          <a:bodyPr rtlCol="0" anchor="ctr"/>
-          <a:lstStyle/>
-          <a:p>
-            <a:pPr algn="ctr"/>
-            <a:endParaRPr lang="en-US"/>
-          </a:p>
-        </p:txBody>
-      </p:sp>
-      <p:sp>
-        <p:nvSpPr>
-          <p:cNvPr id="13" name="Rectangle 12"/>
-          <p:cNvSpPr/>
-          <p:nvPr/>
-        </p:nvSpPr>
-        <p:spPr>
-          <a:xfrm>
-            <a:off x="914400" y="1770611"/>
-            <a:ext cx="2743200" cy="457200"/>
-          </a:xfrm>
-          <a:prstGeom prst="rect">
-            <a:avLst/>
-          </a:prstGeom>
-          <a:solidFill>
-            <a:schemeClr val="bg1"/>
-          </a:solidFill>
-          <a:ln>
-            <a:noFill/>
-          </a:ln>
-        </p:spPr>
-        <p:style>
-          <a:lnRef idx="2">
-            <a:schemeClr val="accent1">
-              <a:shade val="50000"/>
-            </a:schemeClr>
-          </a:lnRef>
-          <a:fillRef idx="1">
-            <a:schemeClr val="accent1"/>
-          </a:fillRef>
-          <a:effectRef idx="0">
-            <a:schemeClr val="accent1"/>
-          </a:effectRef>
-          <a:fontRef idx="minor">
-            <a:schemeClr val="lt1"/>
-          </a:fontRef>
-        </p:style>
-        <p:txBody>
-          <a:bodyPr rtlCol="0" anchor="ctr"/>
-          <a:lstStyle/>
-          <a:p>
-            <a:pPr algn="ctr"/>
-            <a:endParaRPr lang="en-US"/>
-          </a:p>
-        </p:txBody>
-      </p:sp>
-      <p:sp>
-        <p:nvSpPr>
-          <p:cNvPr id="14" name="Rectangle 13"/>
-          <p:cNvSpPr/>
-          <p:nvPr/>
-        </p:nvSpPr>
-        <p:spPr>
-          <a:xfrm>
-            <a:off x="914400" y="2113588"/>
-            <a:ext cx="423949" cy="1477510"/>
-          </a:xfrm>
-          <a:prstGeom prst="rect">
-            <a:avLst/>
-          </a:prstGeom>
-          <a:solidFill>
-            <a:schemeClr val="bg1"/>
-          </a:solidFill>
-          <a:ln>
-            <a:noFill/>
-          </a:ln>
-        </p:spPr>
-        <p:style>
-          <a:lnRef idx="2">
-            <a:schemeClr val="accent1">
-              <a:shade val="50000"/>
-            </a:schemeClr>
-          </a:lnRef>
-          <a:fillRef idx="1">
-            <a:schemeClr val="accent1"/>
-          </a:fillRef>
-          <a:effectRef idx="0">
-            <a:schemeClr val="accent1"/>
-          </a:effectRef>
-          <a:fontRef idx="minor">
-            <a:schemeClr val="lt1"/>
-          </a:fontRef>
-        </p:style>
-        <p:txBody>
-          <a:bodyPr rtlCol="0" anchor="ctr"/>
-          <a:lstStyle/>
-          <a:p>
-            <a:pPr algn="ctr"/>
-            <a:endParaRPr lang="en-US"/>
-          </a:p>
-        </p:txBody>
-      </p:sp>
-      <p:sp>
-        <p:nvSpPr>
-          <p:cNvPr id="15" name="Rectangle 14"/>
-          <p:cNvSpPr/>
-          <p:nvPr/>
-        </p:nvSpPr>
-        <p:spPr>
-          <a:xfrm>
-            <a:off x="3233651" y="2113588"/>
-            <a:ext cx="423949" cy="1477510"/>
-          </a:xfrm>
-          <a:prstGeom prst="rect">
-            <a:avLst/>
-          </a:prstGeom>
-          <a:solidFill>
-            <a:schemeClr val="bg1"/>
-          </a:solidFill>
-          <a:ln>
-            <a:noFill/>
-          </a:ln>
-        </p:spPr>
-        <p:style>
-          <a:lnRef idx="2">
-            <a:schemeClr val="accent1">
-              <a:shade val="50000"/>
-            </a:schemeClr>
-          </a:lnRef>
-          <a:fillRef idx="1">
-            <a:schemeClr val="accent1"/>
-          </a:fillRef>
-          <a:effectRef idx="0">
-            <a:schemeClr val="accent1"/>
-          </a:effectRef>
-          <a:fontRef idx="minor">
-            <a:schemeClr val="lt1"/>
-          </a:fontRef>
-        </p:style>
-        <p:txBody>
-          <a:bodyPr rtlCol="0" anchor="ctr"/>
-          <a:lstStyle/>
-          <a:p>
-            <a:pPr algn="ctr"/>
-            <a:endParaRPr lang="en-US"/>
-          </a:p>
-        </p:txBody>
-      </p:sp>
-    </p:spTree>
-    <p:extLst>
-      <p:ext uri="{BB962C8B-B14F-4D97-AF65-F5344CB8AC3E}">
-        <p14:creationId xmlns:p14="http://schemas.microsoft.com/office/powerpoint/2010/main" val="2477081356"/>
-      </p:ext>
-    </p:extLst>
-  </p:cSld>
-  <p:clrMapOvr>
-    <a:masterClrMapping/>
-  </p:clrMapOvr>
-  <p:timing>
-    <p:tnLst>
-      <p:par>
-        <p:cTn id="1" dur="indefinite" restart="never" nodeType="tmRoot"/>
-      </p:par>
-    </p:tnLst>
-  </p:timing>
-</p:sld>
-</file>
-
-<file path=ppt/slides/slide7.xml><?xml version="1.0" encoding="utf-8"?>
-<p:sld xmlns:a="http://schemas.openxmlformats.org/drawingml/2006/main" xmlns:r="http://schemas.openxmlformats.org/officeDocument/2006/relationships" xmlns:p="http://schemas.openxmlformats.org/presentationml/2006/main">
-  <p:cSld>
-    <p:spTree>
-      <p:nvGrpSpPr>
-        <p:cNvPr id="1" name=""/>
-        <p:cNvGrpSpPr/>
-        <p:nvPr/>
-      </p:nvGrpSpPr>
-      <p:grpSpPr>
-        <a:xfrm>
-          <a:off x="0" y="0"/>
-          <a:ext cx="0" cy="0"/>
-          <a:chOff x="0" y="0"/>
-          <a:chExt cx="0" cy="0"/>
-        </a:xfrm>
-      </p:grpSpPr>
-      <p:sp>
-        <p:nvSpPr>
-          <p:cNvPr id="5" name="Rectangle 4"/>
-          <p:cNvSpPr/>
-          <p:nvPr/>
-        </p:nvSpPr>
-        <p:spPr>
-          <a:xfrm>
-            <a:off x="-1" y="0"/>
-            <a:ext cx="4572000" cy="4572000"/>
-          </a:xfrm>
-          <a:prstGeom prst="rect">
-            <a:avLst/>
-          </a:prstGeom>
-          <a:solidFill>
-            <a:srgbClr val="000064"/>
-          </a:solidFill>
-          <a:ln>
-            <a:solidFill>
-              <a:srgbClr val="000064"/>
-            </a:solidFill>
-          </a:ln>
-        </p:spPr>
-        <p:style>
-          <a:lnRef idx="2">
-            <a:schemeClr val="accent1">
-              <a:shade val="50000"/>
-            </a:schemeClr>
-          </a:lnRef>
-          <a:fillRef idx="1">
-            <a:schemeClr val="accent1"/>
-          </a:fillRef>
-          <a:effectRef idx="0">
-            <a:schemeClr val="accent1"/>
-          </a:effectRef>
-          <a:fontRef idx="minor">
-            <a:schemeClr val="lt1"/>
-          </a:fontRef>
-        </p:style>
-        <p:txBody>
-          <a:bodyPr rtlCol="0" anchor="ctr"/>
-          <a:lstStyle/>
-          <a:p>
-            <a:pPr algn="ctr"/>
-            <a:endParaRPr lang="en-US"/>
-          </a:p>
-        </p:txBody>
-      </p:sp>
-      <p:grpSp>
-        <p:nvGrpSpPr>
-          <p:cNvPr id="2" name="Group 1"/>
-          <p:cNvGrpSpPr/>
-          <p:nvPr/>
-        </p:nvGrpSpPr>
-        <p:grpSpPr>
-          <a:xfrm>
-            <a:off x="1382359" y="1507721"/>
-            <a:ext cx="1807279" cy="1556558"/>
-            <a:chOff x="1382360" y="1230185"/>
-            <a:chExt cx="1807279" cy="1556558"/>
-          </a:xfrm>
-        </p:grpSpPr>
-        <p:sp>
-          <p:nvSpPr>
-            <p:cNvPr id="9" name="Rectangle 8"/>
-            <p:cNvSpPr/>
-            <p:nvPr/>
-          </p:nvSpPr>
-          <p:spPr>
-            <a:xfrm>
-              <a:off x="2238990" y="1230185"/>
-              <a:ext cx="950649" cy="1556558"/>
-            </a:xfrm>
-            <a:prstGeom prst="rect">
-              <a:avLst/>
-            </a:prstGeom>
-            <a:solidFill>
-              <a:schemeClr val="bg1"/>
-            </a:solidFill>
-            <a:ln w="38100">
-              <a:solidFill>
-                <a:srgbClr val="000064"/>
-              </a:solidFill>
-            </a:ln>
-            <a:scene3d>
-              <a:camera prst="isometricOffAxis1Right"/>
-              <a:lightRig rig="threePt" dir="t"/>
-            </a:scene3d>
-          </p:spPr>
-          <p:style>
-            <a:lnRef idx="2">
-              <a:schemeClr val="accent1">
-                <a:shade val="50000"/>
-              </a:schemeClr>
-            </a:lnRef>
-            <a:fillRef idx="1">
-              <a:schemeClr val="accent1"/>
-            </a:fillRef>
-            <a:effectRef idx="0">
-              <a:schemeClr val="accent1"/>
-            </a:effectRef>
-            <a:fontRef idx="minor">
-              <a:schemeClr val="lt1"/>
-            </a:fontRef>
-          </p:style>
-          <p:txBody>
-            <a:bodyPr rtlCol="0" anchor="ctr"/>
-            <a:lstStyle/>
-            <a:p>
-              <a:pPr algn="ctr"/>
-              <a:endParaRPr lang="en-US"/>
-            </a:p>
-          </p:txBody>
-        </p:sp>
-        <p:sp>
-          <p:nvSpPr>
-            <p:cNvPr id="10" name="Rectangle 9"/>
-            <p:cNvSpPr/>
-            <p:nvPr/>
-          </p:nvSpPr>
-          <p:spPr>
-            <a:xfrm>
-              <a:off x="1382360" y="1230185"/>
-              <a:ext cx="950649" cy="1556558"/>
-            </a:xfrm>
-            <a:prstGeom prst="rect">
-              <a:avLst/>
-            </a:prstGeom>
-            <a:solidFill>
-              <a:schemeClr val="bg1"/>
-            </a:solidFill>
-            <a:ln w="38100">
-              <a:solidFill>
-                <a:srgbClr val="000064"/>
-              </a:solidFill>
-            </a:ln>
-            <a:scene3d>
-              <a:camera prst="isometricOffAxis2Left"/>
-              <a:lightRig rig="threePt" dir="t"/>
-            </a:scene3d>
-          </p:spPr>
-          <p:style>
-            <a:lnRef idx="2">
-              <a:schemeClr val="accent1">
-                <a:shade val="50000"/>
-              </a:schemeClr>
-            </a:lnRef>
-            <a:fillRef idx="1">
-              <a:schemeClr val="accent1"/>
-            </a:fillRef>
-            <a:effectRef idx="0">
-              <a:schemeClr val="accent1"/>
-            </a:effectRef>
-            <a:fontRef idx="minor">
-              <a:schemeClr val="lt1"/>
-            </a:fontRef>
-          </p:style>
-          <p:txBody>
-            <a:bodyPr rtlCol="0" anchor="ctr"/>
-            <a:lstStyle/>
-            <a:p>
-              <a:pPr algn="ctr"/>
-              <a:endParaRPr lang="en-US"/>
-            </a:p>
-          </p:txBody>
-        </p:sp>
-      </p:grpSp>
-    </p:spTree>
-    <p:extLst>
-      <p:ext uri="{BB962C8B-B14F-4D97-AF65-F5344CB8AC3E}">
-        <p14:creationId xmlns:p14="http://schemas.microsoft.com/office/powerpoint/2010/main" val="231432628"/>
-      </p:ext>
-    </p:extLst>
-  </p:cSld>
-  <p:clrMapOvr>
-    <a:masterClrMapping/>
-  </p:clrMapOvr>
-  <p:timing>
-    <p:tnLst>
-      <p:par>
-        <p:cTn id="1" dur="indefinite" restart="never" nodeType="tmRoot"/>
-      </p:par>
-    </p:tnLst>
-  </p:timing>
-</p:sld>
-</file>
-
-<file path=ppt/slides/slide8.xml><?xml version="1.0" encoding="utf-8"?>
-<p:sld xmlns:a="http://schemas.openxmlformats.org/drawingml/2006/main" xmlns:r="http://schemas.openxmlformats.org/officeDocument/2006/relationships" xmlns:p="http://schemas.openxmlformats.org/presentationml/2006/main">
-  <p:cSld>
-    <p:spTree>
-      <p:nvGrpSpPr>
-        <p:cNvPr id="1" name=""/>
-        <p:cNvGrpSpPr/>
-        <p:nvPr/>
-      </p:nvGrpSpPr>
-      <p:grpSpPr>
-        <a:xfrm>
-          <a:off x="0" y="0"/>
-          <a:ext cx="0" cy="0"/>
-          <a:chOff x="0" y="0"/>
-          <a:chExt cx="0" cy="0"/>
-        </a:xfrm>
-      </p:grpSpPr>
-      <p:sp>
-        <p:nvSpPr>
-          <p:cNvPr id="7" name="Rectangle 6"/>
-          <p:cNvSpPr/>
-          <p:nvPr/>
-        </p:nvSpPr>
-        <p:spPr>
-          <a:xfrm>
-            <a:off x="-1" y="0"/>
-            <a:ext cx="4572000" cy="4572000"/>
-          </a:xfrm>
-          <a:prstGeom prst="rect">
-            <a:avLst/>
-          </a:prstGeom>
-          <a:solidFill>
-            <a:srgbClr val="000064"/>
-          </a:solidFill>
-          <a:ln>
-            <a:solidFill>
-              <a:srgbClr val="000064"/>
-            </a:solidFill>
-          </a:ln>
-        </p:spPr>
-        <p:style>
-          <a:lnRef idx="2">
-            <a:schemeClr val="accent1">
-              <a:shade val="50000"/>
-            </a:schemeClr>
-          </a:lnRef>
-          <a:fillRef idx="1">
-            <a:schemeClr val="accent1"/>
-          </a:fillRef>
-          <a:effectRef idx="0">
-            <a:schemeClr val="accent1"/>
-          </a:effectRef>
-          <a:fontRef idx="minor">
-            <a:schemeClr val="lt1"/>
-          </a:fontRef>
-        </p:style>
-        <p:txBody>
-          <a:bodyPr rtlCol="0" anchor="ctr"/>
-          <a:lstStyle/>
-          <a:p>
-            <a:pPr algn="ctr"/>
-            <a:endParaRPr lang="en-US"/>
-          </a:p>
-        </p:txBody>
-      </p:sp>
-      <p:sp>
-        <p:nvSpPr>
-          <p:cNvPr id="2" name="Rounded Rectangle 1"/>
-          <p:cNvSpPr/>
-          <p:nvPr/>
-        </p:nvSpPr>
-        <p:spPr>
-          <a:xfrm>
-            <a:off x="685800" y="1371600"/>
-            <a:ext cx="3200400" cy="1828800"/>
-          </a:xfrm>
-          <a:prstGeom prst="roundRect">
-            <a:avLst>
-              <a:gd name="adj" fmla="val 3419"/>
-            </a:avLst>
-          </a:prstGeom>
-          <a:solidFill>
-            <a:schemeClr val="bg1"/>
-          </a:solidFill>
-          <a:ln>
-            <a:solidFill>
-              <a:schemeClr val="bg1"/>
-            </a:solidFill>
-          </a:ln>
-        </p:spPr>
-        <p:style>
-          <a:lnRef idx="2">
-            <a:schemeClr val="accent1">
-              <a:shade val="50000"/>
-            </a:schemeClr>
-          </a:lnRef>
-          <a:fillRef idx="1">
-            <a:schemeClr val="accent1"/>
-          </a:fillRef>
-          <a:effectRef idx="0">
-            <a:schemeClr val="accent1"/>
-          </a:effectRef>
-          <a:fontRef idx="minor">
-            <a:schemeClr val="lt1"/>
-          </a:fontRef>
-        </p:style>
-        <p:txBody>
-          <a:bodyPr rtlCol="0" anchor="ctr"/>
-          <a:lstStyle/>
-          <a:p>
-            <a:pPr algn="ctr"/>
-            <a:endParaRPr lang="en-US"/>
-          </a:p>
-        </p:txBody>
-      </p:sp>
-      <p:sp>
-        <p:nvSpPr>
-          <p:cNvPr id="3" name="Oval 2"/>
-          <p:cNvSpPr/>
-          <p:nvPr/>
-        </p:nvSpPr>
-        <p:spPr>
-          <a:xfrm>
-            <a:off x="2353963" y="1648389"/>
-            <a:ext cx="1276865" cy="1275222"/>
-          </a:xfrm>
-          <a:prstGeom prst="ellipse">
-            <a:avLst/>
-          </a:prstGeom>
-          <a:solidFill>
-            <a:schemeClr val="bg1"/>
-          </a:solidFill>
-          <a:ln w="127000">
-            <a:solidFill>
-              <a:srgbClr val="000064"/>
-            </a:solidFill>
-          </a:ln>
-        </p:spPr>
-        <p:style>
-          <a:lnRef idx="2">
-            <a:schemeClr val="accent1">
-              <a:shade val="50000"/>
-            </a:schemeClr>
-          </a:lnRef>
-          <a:fillRef idx="1">
-            <a:schemeClr val="accent1"/>
-          </a:fillRef>
-          <a:effectRef idx="0">
-            <a:schemeClr val="accent1"/>
-          </a:effectRef>
-          <a:fontRef idx="minor">
-            <a:schemeClr val="lt1"/>
-          </a:fontRef>
-        </p:style>
-        <p:txBody>
-          <a:bodyPr rtlCol="0" anchor="ctr"/>
-          <a:lstStyle/>
-          <a:p>
-            <a:pPr algn="ctr"/>
-            <a:endParaRPr lang="en-US"/>
-          </a:p>
-        </p:txBody>
-      </p:sp>
-      <p:sp>
-        <p:nvSpPr>
-          <p:cNvPr id="12" name="Oval 11"/>
-          <p:cNvSpPr/>
-          <p:nvPr/>
-        </p:nvSpPr>
-        <p:spPr>
-          <a:xfrm>
-            <a:off x="2154436" y="1516994"/>
-            <a:ext cx="263128" cy="262789"/>
-          </a:xfrm>
-          <a:prstGeom prst="ellipse">
-            <a:avLst/>
-          </a:prstGeom>
-          <a:solidFill>
-            <a:srgbClr val="000064"/>
-          </a:solidFill>
-          <a:ln w="38100">
-            <a:noFill/>
-          </a:ln>
-        </p:spPr>
-        <p:style>
-          <a:lnRef idx="2">
-            <a:schemeClr val="accent1">
-              <a:shade val="50000"/>
-            </a:schemeClr>
-          </a:lnRef>
-          <a:fillRef idx="1">
-            <a:schemeClr val="accent1"/>
-          </a:fillRef>
-          <a:effectRef idx="0">
-            <a:schemeClr val="accent1"/>
-          </a:effectRef>
-          <a:fontRef idx="minor">
-            <a:schemeClr val="lt1"/>
-          </a:fontRef>
-        </p:style>
-        <p:txBody>
-          <a:bodyPr rtlCol="0" anchor="ctr"/>
-          <a:lstStyle/>
-          <a:p>
-            <a:pPr algn="ctr"/>
-            <a:endParaRPr lang="en-US"/>
-          </a:p>
-        </p:txBody>
-      </p:sp>
-      <p:sp>
-        <p:nvSpPr>
-          <p:cNvPr id="13" name="Rounded Rectangle 12"/>
-          <p:cNvSpPr/>
-          <p:nvPr/>
-        </p:nvSpPr>
-        <p:spPr>
-          <a:xfrm>
-            <a:off x="999864" y="1192390"/>
-            <a:ext cx="314064" cy="119473"/>
-          </a:xfrm>
-          <a:prstGeom prst="roundRect">
-            <a:avLst>
-              <a:gd name="adj" fmla="val 6738"/>
-            </a:avLst>
-          </a:prstGeom>
-          <a:solidFill>
-            <a:schemeClr val="bg1"/>
-          </a:solidFill>
-          <a:ln>
-            <a:noFill/>
-          </a:ln>
-        </p:spPr>
-        <p:style>
-          <a:lnRef idx="2">
-            <a:schemeClr val="accent1">
-              <a:shade val="50000"/>
-            </a:schemeClr>
-          </a:lnRef>
-          <a:fillRef idx="1">
-            <a:schemeClr val="accent1"/>
-          </a:fillRef>
-          <a:effectRef idx="0">
-            <a:schemeClr val="accent1"/>
-          </a:effectRef>
-          <a:fontRef idx="minor">
-            <a:schemeClr val="lt1"/>
-          </a:fontRef>
-        </p:style>
-        <p:txBody>
-          <a:bodyPr rtlCol="0" anchor="ctr"/>
-          <a:lstStyle/>
-          <a:p>
-            <a:pPr algn="ctr"/>
-            <a:endParaRPr lang="en-US"/>
-          </a:p>
-        </p:txBody>
-      </p:sp>
-    </p:spTree>
-    <p:extLst>
-      <p:ext uri="{BB962C8B-B14F-4D97-AF65-F5344CB8AC3E}">
-        <p14:creationId xmlns:p14="http://schemas.microsoft.com/office/powerpoint/2010/main" val="561755351"/>
-      </p:ext>
-    </p:extLst>
-  </p:cSld>
-  <p:clrMapOvr>
-    <a:masterClrMapping/>
-  </p:clrMapOvr>
-  <p:timing>
-    <p:tnLst>
-      <p:par>
-        <p:cTn id="1" dur="indefinite" restart="never" nodeType="tmRoot"/>
-      </p:par>
-    </p:tnLst>
-  </p:timing>
-</p:sld>
-</file>
-
-<file path=ppt/slides/slide9.xml><?xml version="1.0" encoding="utf-8"?>
-<p:sld xmlns:a="http://schemas.openxmlformats.org/drawingml/2006/main" xmlns:r="http://schemas.openxmlformats.org/officeDocument/2006/relationships" xmlns:p="http://schemas.openxmlformats.org/presentationml/2006/main">
-  <p:cSld>
-    <p:spTree>
-      <p:nvGrpSpPr>
-        <p:cNvPr id="1" name=""/>
-        <p:cNvGrpSpPr/>
-        <p:nvPr/>
-      </p:nvGrpSpPr>
-      <p:grpSpPr>
-        <a:xfrm>
-          <a:off x="0" y="0"/>
-          <a:ext cx="0" cy="0"/>
-          <a:chOff x="0" y="0"/>
-          <a:chExt cx="0" cy="0"/>
-        </a:xfrm>
-      </p:grpSpPr>
-      <p:sp>
-        <p:nvSpPr>
-          <p:cNvPr id="8" name="Rectangle 7"/>
-          <p:cNvSpPr/>
-          <p:nvPr/>
-        </p:nvSpPr>
-        <p:spPr>
-          <a:xfrm>
-            <a:off x="0" y="0"/>
-            <a:ext cx="4572000" cy="4572000"/>
-          </a:xfrm>
-          <a:prstGeom prst="rect">
-            <a:avLst/>
-          </a:prstGeom>
-          <a:solidFill>
-            <a:srgbClr val="000064"/>
-          </a:solidFill>
-          <a:ln>
-            <a:solidFill>
-              <a:srgbClr val="000064"/>
-            </a:solidFill>
-          </a:ln>
-        </p:spPr>
-        <p:style>
-          <a:lnRef idx="2">
-            <a:schemeClr val="accent1">
-              <a:shade val="50000"/>
-            </a:schemeClr>
-          </a:lnRef>
-          <a:fillRef idx="1">
-            <a:schemeClr val="accent1"/>
-          </a:fillRef>
-          <a:effectRef idx="0">
-            <a:schemeClr val="accent1"/>
-          </a:effectRef>
-          <a:fontRef idx="minor">
-            <a:schemeClr val="lt1"/>
-          </a:fontRef>
-        </p:style>
-        <p:txBody>
-          <a:bodyPr rtlCol="0" anchor="ctr"/>
-          <a:lstStyle/>
-          <a:p>
-            <a:pPr algn="ctr"/>
-            <a:endParaRPr lang="en-US"/>
-          </a:p>
-        </p:txBody>
-      </p:sp>
-      <p:sp>
-        <p:nvSpPr>
-          <p:cNvPr id="2" name="Rounded Rectangle 1"/>
-          <p:cNvSpPr/>
-          <p:nvPr/>
-        </p:nvSpPr>
-        <p:spPr>
-          <a:xfrm>
-            <a:off x="1485900" y="800100"/>
-            <a:ext cx="1600200" cy="2971800"/>
-          </a:xfrm>
-          <a:prstGeom prst="roundRect">
-            <a:avLst>
-              <a:gd name="adj" fmla="val 4312"/>
-            </a:avLst>
-          </a:prstGeom>
-          <a:solidFill>
-            <a:schemeClr val="bg1"/>
-          </a:solidFill>
-          <a:ln>
-            <a:solidFill>
-              <a:srgbClr val="000064"/>
-            </a:solidFill>
-          </a:ln>
-        </p:spPr>
-        <p:style>
-          <a:lnRef idx="2">
-            <a:schemeClr val="accent1">
-              <a:shade val="50000"/>
-            </a:schemeClr>
-          </a:lnRef>
-          <a:fillRef idx="1">
-            <a:schemeClr val="accent1"/>
-          </a:fillRef>
-          <a:effectRef idx="0">
-            <a:schemeClr val="accent1"/>
-          </a:effectRef>
-          <a:fontRef idx="minor">
-            <a:schemeClr val="lt1"/>
-          </a:fontRef>
-        </p:style>
-        <p:txBody>
-          <a:bodyPr rtlCol="0" anchor="ctr"/>
-          <a:lstStyle/>
-          <a:p>
-            <a:pPr algn="ctr"/>
-            <a:endParaRPr lang="en-US"/>
-          </a:p>
-        </p:txBody>
-      </p:sp>
-      <p:sp>
-        <p:nvSpPr>
-          <p:cNvPr id="3" name="Rectangle 2"/>
-          <p:cNvSpPr/>
-          <p:nvPr/>
-        </p:nvSpPr>
-        <p:spPr>
-          <a:xfrm>
-            <a:off x="1600200" y="1028700"/>
-            <a:ext cx="1371600" cy="2514600"/>
-          </a:xfrm>
-          <a:prstGeom prst="rect">
-            <a:avLst/>
-          </a:prstGeom>
-          <a:solidFill>
-            <a:srgbClr val="000064"/>
-          </a:solidFill>
-          <a:ln>
-            <a:solidFill>
-              <a:schemeClr val="bg1"/>
-            </a:solidFill>
-          </a:ln>
-        </p:spPr>
-        <p:style>
-          <a:lnRef idx="2">
-            <a:schemeClr val="accent1">
-              <a:shade val="50000"/>
-            </a:schemeClr>
-          </a:lnRef>
-          <a:fillRef idx="1">
-            <a:schemeClr val="accent1"/>
-          </a:fillRef>
-          <a:effectRef idx="0">
-            <a:schemeClr val="accent1"/>
-          </a:effectRef>
-          <a:fontRef idx="minor">
-            <a:schemeClr val="lt1"/>
-          </a:fontRef>
-        </p:style>
-        <p:txBody>
-          <a:bodyPr rtlCol="0" anchor="ctr"/>
-          <a:lstStyle/>
-          <a:p>
-            <a:pPr algn="ctr"/>
-            <a:endParaRPr lang="en-US"/>
-          </a:p>
-        </p:txBody>
-      </p:sp>
-      <p:sp>
-        <p:nvSpPr>
-          <p:cNvPr id="5" name="Rounded Rectangle 4"/>
-          <p:cNvSpPr/>
-          <p:nvPr/>
-        </p:nvSpPr>
-        <p:spPr>
-          <a:xfrm>
-            <a:off x="2171700" y="3589020"/>
-            <a:ext cx="228600" cy="137160"/>
-          </a:xfrm>
-          <a:prstGeom prst="roundRect">
-            <a:avLst/>
-          </a:prstGeom>
-          <a:solidFill>
-            <a:srgbClr val="000064"/>
-          </a:solidFill>
-          <a:ln>
-            <a:noFill/>
-          </a:ln>
-        </p:spPr>
-        <p:style>
-          <a:lnRef idx="2">
-            <a:schemeClr val="accent1">
-              <a:shade val="50000"/>
-            </a:schemeClr>
-          </a:lnRef>
-          <a:fillRef idx="1">
-            <a:schemeClr val="accent1"/>
-          </a:fillRef>
-          <a:effectRef idx="0">
-            <a:schemeClr val="accent1"/>
-          </a:effectRef>
-          <a:fontRef idx="minor">
-            <a:schemeClr val="lt1"/>
-          </a:fontRef>
-        </p:style>
-        <p:txBody>
-          <a:bodyPr rtlCol="0" anchor="ctr"/>
-          <a:lstStyle/>
-          <a:p>
-            <a:pPr algn="ctr"/>
-            <a:endParaRPr lang="en-US"/>
-          </a:p>
-        </p:txBody>
-      </p:sp>
-      <p:sp>
-        <p:nvSpPr>
-          <p:cNvPr id="6" name="Oval 5"/>
-          <p:cNvSpPr/>
-          <p:nvPr/>
-        </p:nvSpPr>
-        <p:spPr>
-          <a:xfrm>
-            <a:off x="2515630" y="868680"/>
-            <a:ext cx="91440" cy="91440"/>
-          </a:xfrm>
-          <a:prstGeom prst="ellipse">
-            <a:avLst/>
-          </a:prstGeom>
-          <a:solidFill>
-            <a:srgbClr val="000064"/>
-          </a:solidFill>
-          <a:ln>
-            <a:noFill/>
-          </a:ln>
-        </p:spPr>
-        <p:style>
-          <a:lnRef idx="2">
-            <a:schemeClr val="accent1">
-              <a:shade val="50000"/>
-            </a:schemeClr>
-          </a:lnRef>
-          <a:fillRef idx="1">
-            <a:schemeClr val="accent1"/>
-          </a:fillRef>
-          <a:effectRef idx="0">
-            <a:schemeClr val="accent1"/>
-          </a:effectRef>
-          <a:fontRef idx="minor">
-            <a:schemeClr val="lt1"/>
-          </a:fontRef>
-        </p:style>
-        <p:txBody>
-          <a:bodyPr rtlCol="0" anchor="ctr"/>
-          <a:lstStyle/>
-          <a:p>
-            <a:pPr algn="ctr"/>
-            <a:endParaRPr lang="en-US"/>
-          </a:p>
-        </p:txBody>
-      </p:sp>
-      <p:sp>
-        <p:nvSpPr>
-          <p:cNvPr id="7" name="Rounded Rectangle 6"/>
-          <p:cNvSpPr/>
-          <p:nvPr/>
-        </p:nvSpPr>
-        <p:spPr>
-          <a:xfrm>
-            <a:off x="2217420" y="891540"/>
-            <a:ext cx="137160" cy="45719"/>
-          </a:xfrm>
-          <a:prstGeom prst="roundRect">
-            <a:avLst>
-              <a:gd name="adj" fmla="val 38584"/>
-            </a:avLst>
-          </a:prstGeom>
-          <a:solidFill>
-            <a:srgbClr val="000064"/>
-          </a:solidFill>
-          <a:ln>
-            <a:noFill/>
-          </a:ln>
-        </p:spPr>
-        <p:style>
-          <a:lnRef idx="2">
-            <a:schemeClr val="accent1">
-              <a:shade val="50000"/>
-            </a:schemeClr>
-          </a:lnRef>
-          <a:fillRef idx="1">
-            <a:schemeClr val="accent1"/>
-          </a:fillRef>
-          <a:effectRef idx="0">
-            <a:schemeClr val="accent1"/>
-          </a:effectRef>
-          <a:fontRef idx="minor">
-            <a:schemeClr val="lt1"/>
-          </a:fontRef>
-        </p:style>
-        <p:txBody>
-          <a:bodyPr rtlCol="0" anchor="ctr"/>
-          <a:lstStyle/>
-          <a:p>
-            <a:pPr algn="ctr"/>
-            <a:endParaRPr lang="en-US"/>
-          </a:p>
-        </p:txBody>
-      </p:sp>
-    </p:spTree>
-    <p:extLst>
-      <p:ext uri="{BB962C8B-B14F-4D97-AF65-F5344CB8AC3E}">
-        <p14:creationId xmlns:p14="http://schemas.microsoft.com/office/powerpoint/2010/main" val="2775428243"/>
       </p:ext>
     </p:extLst>
   </p:cSld>

</xml_diff>